<commit_message>
Implementing GSKY to Thredds Integration
</commit_message>
<xml_diff>
--- a/Documents/ows/GSKY-Thredds_Integration.pptx
+++ b/Documents/ows/GSKY-Thredds_Integration.pptx
@@ -207,7 +207,7 @@
           <a:p>
             <a:fld id="{C72DBEC5-06AB-48E0-952A-026FDA33E51C}" type="datetimeFigureOut">
               <a:rPr lang="en-AU" smtClean="0"/>
-              <a:t>21/12/2018</a:t>
+              <a:t>5/02/2019</a:t>
             </a:fld>
             <a:endParaRPr lang="en-AU"/>
           </a:p>
@@ -1054,7 +1054,7 @@
           <a:p>
             <a:fld id="{3ADAF076-6E8D-48BD-BB78-27996FDE916E}" type="datetime1">
               <a:rPr lang="en-US" smtClean="0"/>
-              <a:t>12/21/2018</a:t>
+              <a:t>2/5/2019</a:t>
             </a:fld>
             <a:endParaRPr lang="en-US" dirty="0"/>
           </a:p>
@@ -1271,7 +1271,7 @@
           <a:p>
             <a:fld id="{5BD463C3-4FD6-4E15-A2FC-68448FB46BFB}" type="datetime1">
               <a:rPr lang="en-US" smtClean="0"/>
-              <a:t>12/21/2018</a:t>
+              <a:t>2/5/2019</a:t>
             </a:fld>
             <a:endParaRPr lang="en-US" dirty="0"/>
           </a:p>
@@ -1557,7 +1557,7 @@
           <a:p>
             <a:fld id="{B7FCA03E-80A5-466A-B4B4-2B8FCC7E2AEA}" type="datetime1">
               <a:rPr lang="en-US" smtClean="0"/>
-              <a:t>12/21/2018</a:t>
+              <a:t>2/5/2019</a:t>
             </a:fld>
             <a:endParaRPr lang="en-US" dirty="0"/>
           </a:p>
@@ -2006,7 +2006,7 @@
           <a:p>
             <a:fld id="{BFC04CE4-31EE-4F2B-B744-8EA83E1FE85E}" type="datetime1">
               <a:rPr lang="en-US" smtClean="0"/>
-              <a:t>12/21/2018</a:t>
+              <a:t>2/5/2019</a:t>
             </a:fld>
             <a:endParaRPr lang="en-US" dirty="0"/>
           </a:p>
@@ -2577,7 +2577,7 @@
           <a:p>
             <a:fld id="{5E53FD72-7ED1-4AE3-A5D5-6F68728C4781}" type="datetime1">
               <a:rPr lang="en-US" smtClean="0"/>
-              <a:t>12/21/2018</a:t>
+              <a:t>2/5/2019</a:t>
             </a:fld>
             <a:endParaRPr lang="en-US" dirty="0"/>
           </a:p>
@@ -3424,7 +3424,7 @@
           <a:p>
             <a:fld id="{DB065CE1-EB77-408D-8750-22984ACCA118}" type="datetime1">
               <a:rPr lang="en-US" smtClean="0"/>
-              <a:t>12/21/2018</a:t>
+              <a:t>2/5/2019</a:t>
             </a:fld>
             <a:endParaRPr lang="en-US" dirty="0"/>
           </a:p>
@@ -3624,7 +3624,7 @@
           <a:p>
             <a:fld id="{83D43F08-357A-4172-8503-D86CDAB57223}" type="datetime1">
               <a:rPr lang="en-US" smtClean="0"/>
-              <a:t>12/21/2018</a:t>
+              <a:t>2/5/2019</a:t>
             </a:fld>
             <a:endParaRPr lang="en-US" dirty="0"/>
           </a:p>
@@ -3833,7 +3833,7 @@
           <a:p>
             <a:fld id="{81B3A79B-37D8-44DC-BE4B-FEEEB5E6613B}" type="datetime1">
               <a:rPr lang="en-US" smtClean="0"/>
-              <a:t>12/21/2018</a:t>
+              <a:t>2/5/2019</a:t>
             </a:fld>
             <a:endParaRPr lang="en-US" dirty="0"/>
           </a:p>
@@ -4038,7 +4038,7 @@
           <a:p>
             <a:fld id="{9A46E524-FD8D-452D-9C72-0AC53F7701F7}" type="datetimeFigureOut">
               <a:rPr lang="en-AU" smtClean="0"/>
-              <a:t>21/12/2018</a:t>
+              <a:t>5/02/2019</a:t>
             </a:fld>
             <a:endParaRPr lang="en-AU"/>
           </a:p>
@@ -4238,7 +4238,7 @@
           <a:p>
             <a:fld id="{9A46E524-FD8D-452D-9C72-0AC53F7701F7}" type="datetimeFigureOut">
               <a:rPr lang="en-AU" smtClean="0"/>
-              <a:t>21/12/2018</a:t>
+              <a:t>5/02/2019</a:t>
             </a:fld>
             <a:endParaRPr lang="en-AU"/>
           </a:p>
@@ -4425,7 +4425,7 @@
           <a:p>
             <a:fld id="{8839007D-6BCD-43A3-816F-9B9944EEE7DD}" type="datetime1">
               <a:rPr lang="en-US" smtClean="0"/>
-              <a:t>12/21/2018</a:t>
+              <a:t>2/5/2019</a:t>
             </a:fld>
             <a:endParaRPr lang="en-US" dirty="0"/>
           </a:p>
@@ -4850,7 +4850,7 @@
           <a:p>
             <a:fld id="{9A46E524-FD8D-452D-9C72-0AC53F7701F7}" type="datetimeFigureOut">
               <a:rPr lang="en-AU" smtClean="0"/>
-              <a:t>21/12/2018</a:t>
+              <a:t>5/02/2019</a:t>
             </a:fld>
             <a:endParaRPr lang="en-AU"/>
           </a:p>
@@ -5118,7 +5118,7 @@
           <a:p>
             <a:fld id="{9A46E524-FD8D-452D-9C72-0AC53F7701F7}" type="datetimeFigureOut">
               <a:rPr lang="en-AU" smtClean="0"/>
-              <a:t>21/12/2018</a:t>
+              <a:t>5/02/2019</a:t>
             </a:fld>
             <a:endParaRPr lang="en-AU"/>
           </a:p>
@@ -5533,7 +5533,7 @@
           <a:p>
             <a:fld id="{9A46E524-FD8D-452D-9C72-0AC53F7701F7}" type="datetimeFigureOut">
               <a:rPr lang="en-AU" smtClean="0"/>
-              <a:t>21/12/2018</a:t>
+              <a:t>5/02/2019</a:t>
             </a:fld>
             <a:endParaRPr lang="en-AU"/>
           </a:p>
@@ -5675,7 +5675,7 @@
           <a:p>
             <a:fld id="{9A46E524-FD8D-452D-9C72-0AC53F7701F7}" type="datetimeFigureOut">
               <a:rPr lang="en-AU" smtClean="0"/>
-              <a:t>21/12/2018</a:t>
+              <a:t>5/02/2019</a:t>
             </a:fld>
             <a:endParaRPr lang="en-AU"/>
           </a:p>
@@ -5788,7 +5788,7 @@
           <a:p>
             <a:fld id="{9A46E524-FD8D-452D-9C72-0AC53F7701F7}" type="datetimeFigureOut">
               <a:rPr lang="en-AU" smtClean="0"/>
-              <a:t>21/12/2018</a:t>
+              <a:t>5/02/2019</a:t>
             </a:fld>
             <a:endParaRPr lang="en-AU"/>
           </a:p>
@@ -6101,7 +6101,7 @@
           <a:p>
             <a:fld id="{9A46E524-FD8D-452D-9C72-0AC53F7701F7}" type="datetimeFigureOut">
               <a:rPr lang="en-AU" smtClean="0"/>
-              <a:t>21/12/2018</a:t>
+              <a:t>5/02/2019</a:t>
             </a:fld>
             <a:endParaRPr lang="en-AU"/>
           </a:p>
@@ -6390,7 +6390,7 @@
           <a:p>
             <a:fld id="{9A46E524-FD8D-452D-9C72-0AC53F7701F7}" type="datetimeFigureOut">
               <a:rPr lang="en-AU" smtClean="0"/>
-              <a:t>21/12/2018</a:t>
+              <a:t>5/02/2019</a:t>
             </a:fld>
             <a:endParaRPr lang="en-AU"/>
           </a:p>
@@ -6590,7 +6590,7 @@
           <a:p>
             <a:fld id="{9A46E524-FD8D-452D-9C72-0AC53F7701F7}" type="datetimeFigureOut">
               <a:rPr lang="en-AU" smtClean="0"/>
-              <a:t>21/12/2018</a:t>
+              <a:t>5/02/2019</a:t>
             </a:fld>
             <a:endParaRPr lang="en-AU"/>
           </a:p>
@@ -6800,7 +6800,7 @@
           <a:p>
             <a:fld id="{9A46E524-FD8D-452D-9C72-0AC53F7701F7}" type="datetimeFigureOut">
               <a:rPr lang="en-AU" smtClean="0"/>
-              <a:t>21/12/2018</a:t>
+              <a:t>5/02/2019</a:t>
             </a:fld>
             <a:endParaRPr lang="en-AU"/>
           </a:p>
@@ -7092,7 +7092,7 @@
           <a:p>
             <a:fld id="{7A04BD80-684F-43EC-BD8A-3313B4EC3815}" type="datetime1">
               <a:rPr lang="en-US" smtClean="0"/>
-              <a:t>12/21/2018</a:t>
+              <a:t>2/5/2019</a:t>
             </a:fld>
             <a:endParaRPr lang="en-US" dirty="0"/>
           </a:p>
@@ -7354,7 +7354,7 @@
           <a:p>
             <a:fld id="{E64D2021-F3A0-43D8-B6B3-AE7BBAB9890A}" type="datetime1">
               <a:rPr lang="en-US" smtClean="0"/>
-              <a:t>12/21/2018</a:t>
+              <a:t>2/5/2019</a:t>
             </a:fld>
             <a:endParaRPr lang="en-US" dirty="0"/>
           </a:p>
@@ -7764,7 +7764,7 @@
           <a:p>
             <a:fld id="{182B9AF0-B7DD-4DE1-A9F5-91BE63737632}" type="datetime1">
               <a:rPr lang="en-US" smtClean="0"/>
-              <a:t>12/21/2018</a:t>
+              <a:t>2/5/2019</a:t>
             </a:fld>
             <a:endParaRPr lang="en-US" dirty="0"/>
           </a:p>
@@ -7907,7 +7907,7 @@
           <a:p>
             <a:fld id="{073F85E4-564C-4728-AEFB-C8F906AA693D}" type="datetime1">
               <a:rPr lang="en-US" smtClean="0"/>
-              <a:t>12/21/2018</a:t>
+              <a:t>2/5/2019</a:t>
             </a:fld>
             <a:endParaRPr lang="en-US" dirty="0"/>
           </a:p>
@@ -8027,7 +8027,7 @@
           <a:p>
             <a:fld id="{BE00A3BD-B35C-46C6-B7B7-E519136B132D}" type="datetime1">
               <a:rPr lang="en-US" smtClean="0"/>
-              <a:t>12/21/2018</a:t>
+              <a:t>2/5/2019</a:t>
             </a:fld>
             <a:endParaRPr lang="en-US" dirty="0"/>
           </a:p>
@@ -8301,7 +8301,7 @@
           <a:p>
             <a:fld id="{5BC59E4D-16D2-4652-AD24-ABC7C4E21225}" type="datetime1">
               <a:rPr lang="en-US" smtClean="0"/>
-              <a:t>12/21/2018</a:t>
+              <a:t>2/5/2019</a:t>
             </a:fld>
             <a:endParaRPr lang="en-US" dirty="0"/>
           </a:p>
@@ -8608,7 +8608,7 @@
           <a:p>
             <a:fld id="{A7BFFB6C-937C-401A-B23B-FFE1848A43F3}" type="datetime1">
               <a:rPr lang="en-US" smtClean="0"/>
-              <a:t>12/21/2018</a:t>
+              <a:t>2/5/2019</a:t>
             </a:fld>
             <a:endParaRPr lang="en-US" dirty="0"/>
           </a:p>
@@ -8856,7 +8856,7 @@
           <a:p>
             <a:fld id="{A3AB179A-3664-45B4-AF75-5A588F18B660}" type="datetime1">
               <a:rPr lang="en-US" smtClean="0"/>
-              <a:t>12/21/2018</a:t>
+              <a:t>2/5/2019</a:t>
             </a:fld>
             <a:endParaRPr lang="en-US" dirty="0"/>
           </a:p>
@@ -9450,7 +9450,7 @@
           <a:p>
             <a:fld id="{9A46E524-FD8D-452D-9C72-0AC53F7701F7}" type="datetimeFigureOut">
               <a:rPr lang="en-AU" smtClean="0"/>
-              <a:t>21/12/2018</a:t>
+              <a:t>5/02/2019</a:t>
             </a:fld>
             <a:endParaRPr lang="en-AU"/>
           </a:p>
@@ -10223,13 +10223,13 @@
   <p:clrMapOvr>
     <a:masterClrMapping/>
   </p:clrMapOvr>
-  <mc:AlternateContent xmlns:mc="http://schemas.openxmlformats.org/markup-compatibility/2006">
-    <mc:Choice xmlns:p14="http://schemas.microsoft.com/office/powerpoint/2010/main" Requires="p14">
+  <mc:AlternateContent xmlns:mc="http://schemas.openxmlformats.org/markup-compatibility/2006" xmlns:p14="http://schemas.microsoft.com/office/powerpoint/2010/main">
+    <mc:Choice Requires="p14">
       <p:transition spd="med" p14:dur="700" advTm="4163">
         <p:fade/>
       </p:transition>
     </mc:Choice>
-    <mc:Fallback>
+    <mc:Fallback xmlns="">
       <p:transition spd="med" advTm="4163">
         <p:fade/>
       </p:transition>
@@ -10685,13 +10685,13 @@
   <p:clrMapOvr>
     <a:masterClrMapping/>
   </p:clrMapOvr>
-  <mc:AlternateContent xmlns:mc="http://schemas.openxmlformats.org/markup-compatibility/2006">
-    <mc:Choice xmlns:p14="http://schemas.microsoft.com/office/powerpoint/2010/main" Requires="p14">
+  <mc:AlternateContent xmlns:mc="http://schemas.openxmlformats.org/markup-compatibility/2006" xmlns:p14="http://schemas.microsoft.com/office/powerpoint/2010/main">
+    <mc:Choice Requires="p14">
       <p:transition spd="med" p14:dur="700" advTm="2432">
         <p:fade/>
       </p:transition>
     </mc:Choice>
-    <mc:Fallback>
+    <mc:Fallback xmlns="">
       <p:transition spd="med" advTm="2432">
         <p:fade/>
       </p:transition>
@@ -11156,13 +11156,13 @@
   <p:clrMapOvr>
     <a:masterClrMapping/>
   </p:clrMapOvr>
-  <mc:AlternateContent xmlns:mc="http://schemas.openxmlformats.org/markup-compatibility/2006">
-    <mc:Choice xmlns:p14="http://schemas.microsoft.com/office/powerpoint/2010/main" Requires="p14">
+  <mc:AlternateContent xmlns:mc="http://schemas.openxmlformats.org/markup-compatibility/2006" xmlns:p14="http://schemas.microsoft.com/office/powerpoint/2010/main">
+    <mc:Choice Requires="p14">
       <p:transition spd="med" p14:dur="700" advTm="36664">
         <p:fade/>
       </p:transition>
     </mc:Choice>
-    <mc:Fallback>
+    <mc:Fallback xmlns="">
       <p:transition spd="med" advTm="36664">
         <p:fade/>
       </p:transition>
@@ -12572,13 +12572,13 @@
   <p:clrMapOvr>
     <a:masterClrMapping/>
   </p:clrMapOvr>
-  <mc:AlternateContent xmlns:mc="http://schemas.openxmlformats.org/markup-compatibility/2006">
-    <mc:Choice xmlns:p14="http://schemas.microsoft.com/office/powerpoint/2010/main" Requires="p14">
+  <mc:AlternateContent xmlns:mc="http://schemas.openxmlformats.org/markup-compatibility/2006" xmlns:p14="http://schemas.microsoft.com/office/powerpoint/2010/main">
+    <mc:Choice Requires="p14">
       <p:transition spd="med" p14:dur="700" advTm="23751">
         <p:fade/>
       </p:transition>
     </mc:Choice>
-    <mc:Fallback>
+    <mc:Fallback xmlns="">
       <p:transition spd="med" advTm="23751">
         <p:fade/>
       </p:transition>
@@ -13300,13 +13300,13 @@
   <p:clrMapOvr>
     <a:masterClrMapping/>
   </p:clrMapOvr>
-  <mc:AlternateContent xmlns:mc="http://schemas.openxmlformats.org/markup-compatibility/2006">
-    <mc:Choice xmlns:p14="http://schemas.microsoft.com/office/powerpoint/2010/main" Requires="p14">
+  <mc:AlternateContent xmlns:mc="http://schemas.openxmlformats.org/markup-compatibility/2006" xmlns:p14="http://schemas.microsoft.com/office/powerpoint/2010/main">
+    <mc:Choice Requires="p14">
       <p:transition spd="med" p14:dur="700" advTm="55503">
         <p:fade/>
       </p:transition>
     </mc:Choice>
-    <mc:Fallback>
+    <mc:Fallback xmlns="">
       <p:transition spd="med" advTm="55503">
         <p:fade/>
       </p:transition>
@@ -14449,13 +14449,13 @@
   <p:clrMapOvr>
     <a:masterClrMapping/>
   </p:clrMapOvr>
-  <mc:AlternateContent xmlns:mc="http://schemas.openxmlformats.org/markup-compatibility/2006">
-    <mc:Choice xmlns:p14="http://schemas.microsoft.com/office/powerpoint/2010/main" Requires="p14">
+  <mc:AlternateContent xmlns:mc="http://schemas.openxmlformats.org/markup-compatibility/2006" xmlns:p14="http://schemas.microsoft.com/office/powerpoint/2010/main">
+    <mc:Choice Requires="p14">
       <p:transition spd="med" p14:dur="700" advTm="27471">
         <p:fade/>
       </p:transition>
     </mc:Choice>
-    <mc:Fallback>
+    <mc:Fallback xmlns="">
       <p:transition spd="med" advTm="27471">
         <p:fade/>
       </p:transition>
@@ -16003,13 +16003,13 @@
   <p:clrMapOvr>
     <a:masterClrMapping/>
   </p:clrMapOvr>
-  <mc:AlternateContent xmlns:mc="http://schemas.openxmlformats.org/markup-compatibility/2006">
-    <mc:Choice xmlns:p14="http://schemas.microsoft.com/office/powerpoint/2010/main" Requires="p14">
+  <mc:AlternateContent xmlns:mc="http://schemas.openxmlformats.org/markup-compatibility/2006" xmlns:p14="http://schemas.microsoft.com/office/powerpoint/2010/main">
+    <mc:Choice Requires="p14">
       <p:transition spd="med" p14:dur="700" advTm="8702">
         <p:fade/>
       </p:transition>
     </mc:Choice>
-    <mc:Fallback>
+    <mc:Fallback xmlns="">
       <p:transition spd="med" advTm="8702">
         <p:fade/>
       </p:transition>
@@ -17319,13 +17319,13 @@
   <p:clrMapOvr>
     <a:masterClrMapping/>
   </p:clrMapOvr>
-  <mc:AlternateContent xmlns:mc="http://schemas.openxmlformats.org/markup-compatibility/2006">
-    <mc:Choice xmlns:p14="http://schemas.microsoft.com/office/powerpoint/2010/main" Requires="p14">
+  <mc:AlternateContent xmlns:mc="http://schemas.openxmlformats.org/markup-compatibility/2006" xmlns:p14="http://schemas.microsoft.com/office/powerpoint/2010/main">
+    <mc:Choice Requires="p14">
       <p:transition spd="med" p14:dur="700" advTm="62405">
         <p:fade/>
       </p:transition>
     </mc:Choice>
-    <mc:Fallback>
+    <mc:Fallback xmlns="">
       <p:transition spd="med" advTm="62405">
         <p:fade/>
       </p:transition>
@@ -21789,13 +21789,13 @@
   <p:clrMapOvr>
     <a:masterClrMapping/>
   </p:clrMapOvr>
-  <mc:AlternateContent xmlns:mc="http://schemas.openxmlformats.org/markup-compatibility/2006">
-    <mc:Choice xmlns:p14="http://schemas.microsoft.com/office/powerpoint/2010/main" Requires="p14">
+  <mc:AlternateContent xmlns:mc="http://schemas.openxmlformats.org/markup-compatibility/2006" xmlns:p14="http://schemas.microsoft.com/office/powerpoint/2010/main">
+    <mc:Choice Requires="p14">
       <p:transition spd="med" p14:dur="700" advTm="94367">
         <p:fade/>
       </p:transition>
     </mc:Choice>
-    <mc:Fallback>
+    <mc:Fallback xmlns="">
       <p:transition spd="med" advTm="94367">
         <p:fade/>
       </p:transition>
@@ -23531,6 +23531,66 @@
           <a:chExt cx="0" cy="0"/>
         </a:xfrm>
       </p:grpSpPr>
+      <p:pic>
+        <p:nvPicPr>
+          <p:cNvPr id="45" name="Picture 44">
+            <a:extLst>
+              <a:ext uri="{FF2B5EF4-FFF2-40B4-BE49-F238E27FC236}">
+                <a16:creationId xmlns:a16="http://schemas.microsoft.com/office/drawing/2014/main" id="{B5AA0A65-BDCD-453B-B4FE-07B11CACF93D}"/>
+              </a:ext>
+            </a:extLst>
+          </p:cNvPr>
+          <p:cNvPicPr>
+            <a:picLocks noChangeAspect="1"/>
+          </p:cNvPicPr>
+          <p:nvPr/>
+        </p:nvPicPr>
+        <p:blipFill>
+          <a:blip r:embed="rId3"/>
+          <a:stretch>
+            <a:fillRect/>
+          </a:stretch>
+        </p:blipFill>
+        <p:spPr>
+          <a:xfrm>
+            <a:off x="9201074" y="1961283"/>
+            <a:ext cx="2761905" cy="3685714"/>
+          </a:xfrm>
+          <a:prstGeom prst="rect">
+            <a:avLst/>
+          </a:prstGeom>
+        </p:spPr>
+      </p:pic>
+      <p:pic>
+        <p:nvPicPr>
+          <p:cNvPr id="11" name="Picture 10">
+            <a:extLst>
+              <a:ext uri="{FF2B5EF4-FFF2-40B4-BE49-F238E27FC236}">
+                <a16:creationId xmlns:a16="http://schemas.microsoft.com/office/drawing/2014/main" id="{75D7700C-DEFB-4B5A-B754-B246A7D2EF57}"/>
+              </a:ext>
+            </a:extLst>
+          </p:cNvPr>
+          <p:cNvPicPr>
+            <a:picLocks noChangeAspect="1"/>
+          </p:cNvPicPr>
+          <p:nvPr/>
+        </p:nvPicPr>
+        <p:blipFill>
+          <a:blip r:embed="rId4"/>
+          <a:stretch>
+            <a:fillRect/>
+          </a:stretch>
+        </p:blipFill>
+        <p:spPr>
+          <a:xfrm>
+            <a:off x="6340746" y="1958547"/>
+            <a:ext cx="2780952" cy="2609524"/>
+          </a:xfrm>
+          <a:prstGeom prst="rect">
+            <a:avLst/>
+          </a:prstGeom>
+        </p:spPr>
+      </p:pic>
       <p:sp>
         <p:nvSpPr>
           <p:cNvPr id="4" name="Slide Number Placeholder 3">
@@ -23612,7 +23672,7 @@
               <a:rPr lang="en-US" sz="1050">
                 <a:latin typeface="Calibri" panose="020F0502020204030204" pitchFamily="34" charset="0"/>
                 <a:cs typeface="Calibri" panose="020F0502020204030204" pitchFamily="34" charset="0"/>
-                <a:hlinkClick r:id="rId3"/>
+                <a:hlinkClick r:id="rId5"/>
               </a:rPr>
               <a:t>http://localhost:8080</a:t>
             </a:r>
@@ -23621,7 +23681,7 @@
                 <a:latin typeface="Calibri" panose="020F0502020204030204" pitchFamily="34" charset="0"/>
                 <a:cs typeface="Calibri" panose="020F0502020204030204" pitchFamily="34" charset="0"/>
               </a:rPr>
-              <a:t> will display the Tomcat browser. To do it, we must use an SSH session to the server where Tomcat is running. Given below are the instructions.</a:t>
+              <a:t> will display the Tomcat browser. To do it, we must use an SSH session to the server where Tomcat is running.  See instructions below.</a:t>
             </a:r>
           </a:p>
           <a:p>
@@ -23817,7 +23877,7 @@
               <a:rPr lang="en-US" sz="1000">
                 <a:latin typeface="Calibri" panose="020F0502020204030204" pitchFamily="34" charset="0"/>
                 <a:cs typeface="Calibri" panose="020F0502020204030204" pitchFamily="34" charset="0"/>
-                <a:hlinkClick r:id="rId4"/>
+                <a:hlinkClick r:id="rId6"/>
               </a:rPr>
               <a:t>http://localhost:8080/thredds/catalog.html</a:t>
             </a:r>
@@ -23845,7 +23905,7 @@
               <a:rPr lang="en-US" sz="1000">
                 <a:latin typeface="Calibri" panose="020F0502020204030204" pitchFamily="34" charset="0"/>
                 <a:cs typeface="Calibri" panose="020F0502020204030204" pitchFamily="34" charset="0"/>
-                <a:hlinkClick r:id="rId5"/>
+                <a:hlinkClick r:id="rId7"/>
               </a:rPr>
               <a:t>http://localhost:3001</a:t>
             </a:r>
@@ -23875,41 +23935,6 @@
           </a:p>
         </p:txBody>
       </p:sp>
-      <p:pic>
-        <p:nvPicPr>
-          <p:cNvPr id="9" name="Picture 8">
-            <a:extLst>
-              <a:ext uri="{FF2B5EF4-FFF2-40B4-BE49-F238E27FC236}">
-                <a16:creationId xmlns:a16="http://schemas.microsoft.com/office/drawing/2014/main" id="{90FA1A3B-0912-41AC-8DE6-1C6DD4F353A9}"/>
-              </a:ext>
-            </a:extLst>
-          </p:cNvPr>
-          <p:cNvPicPr>
-            <a:picLocks noChangeAspect="1"/>
-          </p:cNvPicPr>
-          <p:nvPr/>
-        </p:nvPicPr>
-        <p:blipFill>
-          <a:blip r:embed="rId6"/>
-          <a:stretch>
-            <a:fillRect/>
-          </a:stretch>
-        </p:blipFill>
-        <p:spPr>
-          <a:xfrm>
-            <a:off x="6459838" y="4911490"/>
-            <a:ext cx="2695575" cy="600075"/>
-          </a:xfrm>
-          <a:prstGeom prst="rect">
-            <a:avLst/>
-          </a:prstGeom>
-          <a:ln w="3175">
-            <a:solidFill>
-              <a:schemeClr val="tx1"/>
-            </a:solidFill>
-          </a:ln>
-        </p:spPr>
-      </p:pic>
       <p:sp>
         <p:nvSpPr>
           <p:cNvPr id="14" name="TextBox 13">
@@ -23961,10 +23986,10 @@
       </p:sp>
       <p:grpSp>
         <p:nvGrpSpPr>
-          <p:cNvPr id="7" name="Group 6">
+          <p:cNvPr id="16" name="Group 15">
             <a:extLst>
               <a:ext uri="{FF2B5EF4-FFF2-40B4-BE49-F238E27FC236}">
-                <a16:creationId xmlns:a16="http://schemas.microsoft.com/office/drawing/2014/main" id="{32906517-FD66-4496-BE54-440E262E6F1B}"/>
+                <a16:creationId xmlns:a16="http://schemas.microsoft.com/office/drawing/2014/main" id="{62A54306-D59E-4013-BAAB-AC991B403B93}"/>
               </a:ext>
             </a:extLst>
           </p:cNvPr>
@@ -23974,17 +23999,17 @@
         <p:grpSpPr>
           <a:xfrm>
             <a:off x="5143916" y="1965013"/>
-            <a:ext cx="4011497" cy="1552575"/>
-            <a:chOff x="5143916" y="1965013"/>
-            <a:chExt cx="4011497" cy="1552575"/>
+            <a:ext cx="1123950" cy="1552575"/>
+            <a:chOff x="5519472" y="4318906"/>
+            <a:chExt cx="1123950" cy="1552575"/>
           </a:xfrm>
         </p:grpSpPr>
         <p:pic>
           <p:nvPicPr>
-            <p:cNvPr id="8" name="Picture 7">
+            <p:cNvPr id="6" name="Picture 5">
               <a:extLst>
                 <a:ext uri="{FF2B5EF4-FFF2-40B4-BE49-F238E27FC236}">
-                  <a16:creationId xmlns:a16="http://schemas.microsoft.com/office/drawing/2014/main" id="{12387C5D-9BC4-444C-A404-3A77FC8AAA64}"/>
+                  <a16:creationId xmlns:a16="http://schemas.microsoft.com/office/drawing/2014/main" id="{974F101B-5EDD-4CC8-96F6-7BE9BDA032D9}"/>
                 </a:ext>
               </a:extLst>
             </p:cNvPr>
@@ -23994,175 +24019,15 @@
             <p:nvPr/>
           </p:nvPicPr>
           <p:blipFill>
-            <a:blip r:embed="rId7"/>
+            <a:blip r:embed="rId8"/>
             <a:stretch>
               <a:fillRect/>
             </a:stretch>
           </p:blipFill>
           <p:spPr>
             <a:xfrm>
-              <a:off x="6459838" y="1965013"/>
-              <a:ext cx="2695575" cy="1085850"/>
-            </a:xfrm>
-            <a:prstGeom prst="rect">
-              <a:avLst/>
-            </a:prstGeom>
-            <a:ln w="3175">
-              <a:solidFill>
-                <a:schemeClr val="tx1"/>
-              </a:solidFill>
-            </a:ln>
-          </p:spPr>
-        </p:pic>
-        <p:grpSp>
-          <p:nvGrpSpPr>
-            <p:cNvPr id="16" name="Group 15">
-              <a:extLst>
-                <a:ext uri="{FF2B5EF4-FFF2-40B4-BE49-F238E27FC236}">
-                  <a16:creationId xmlns:a16="http://schemas.microsoft.com/office/drawing/2014/main" id="{62A54306-D59E-4013-BAAB-AC991B403B93}"/>
-                </a:ext>
-              </a:extLst>
-            </p:cNvPr>
-            <p:cNvGrpSpPr/>
-            <p:nvPr/>
-          </p:nvGrpSpPr>
-          <p:grpSpPr>
-            <a:xfrm>
-              <a:off x="5143916" y="1965013"/>
+              <a:off x="5519472" y="4318906"/>
               <a:ext cx="1123950" cy="1552575"/>
-              <a:chOff x="5519472" y="4318906"/>
-              <a:chExt cx="1123950" cy="1552575"/>
-            </a:xfrm>
-          </p:grpSpPr>
-          <p:pic>
-            <p:nvPicPr>
-              <p:cNvPr id="6" name="Picture 5">
-                <a:extLst>
-                  <a:ext uri="{FF2B5EF4-FFF2-40B4-BE49-F238E27FC236}">
-                    <a16:creationId xmlns:a16="http://schemas.microsoft.com/office/drawing/2014/main" id="{974F101B-5EDD-4CC8-96F6-7BE9BDA032D9}"/>
-                  </a:ext>
-                </a:extLst>
-              </p:cNvPr>
-              <p:cNvPicPr>
-                <a:picLocks noChangeAspect="1"/>
-              </p:cNvPicPr>
-              <p:nvPr/>
-            </p:nvPicPr>
-            <p:blipFill>
-              <a:blip r:embed="rId8"/>
-              <a:stretch>
-                <a:fillRect/>
-              </a:stretch>
-            </p:blipFill>
-            <p:spPr>
-              <a:xfrm>
-                <a:off x="5519472" y="4318906"/>
-                <a:ext cx="1123950" cy="1552575"/>
-              </a:xfrm>
-              <a:prstGeom prst="rect">
-                <a:avLst/>
-              </a:prstGeom>
-              <a:ln w="3175">
-                <a:solidFill>
-                  <a:schemeClr val="tx1"/>
-                </a:solidFill>
-              </a:ln>
-            </p:spPr>
-          </p:pic>
-          <p:sp>
-            <p:nvSpPr>
-              <p:cNvPr id="15" name="Rectangle 14">
-                <a:extLst>
-                  <a:ext uri="{FF2B5EF4-FFF2-40B4-BE49-F238E27FC236}">
-                    <a16:creationId xmlns:a16="http://schemas.microsoft.com/office/drawing/2014/main" id="{B61BD2AD-78CF-41A9-990F-9647F8FE8217}"/>
-                  </a:ext>
-                </a:extLst>
-              </p:cNvPr>
-              <p:cNvSpPr/>
-              <p:nvPr/>
-            </p:nvSpPr>
-            <p:spPr>
-              <a:xfrm>
-                <a:off x="6071508" y="5392893"/>
-                <a:ext cx="410936" cy="158822"/>
-              </a:xfrm>
-              <a:prstGeom prst="rect">
-                <a:avLst/>
-              </a:prstGeom>
-              <a:noFill/>
-              <a:ln w="3175"/>
-            </p:spPr>
-            <p:style>
-              <a:lnRef idx="2">
-                <a:schemeClr val="accent1">
-                  <a:shade val="50000"/>
-                </a:schemeClr>
-              </a:lnRef>
-              <a:fillRef idx="1">
-                <a:schemeClr val="accent1"/>
-              </a:fillRef>
-              <a:effectRef idx="0">
-                <a:schemeClr val="accent1"/>
-              </a:effectRef>
-              <a:fontRef idx="minor">
-                <a:schemeClr val="lt1"/>
-              </a:fontRef>
-            </p:style>
-            <p:txBody>
-              <a:bodyPr rtlCol="0" anchor="ctr"/>
-              <a:lstStyle/>
-              <a:p>
-                <a:pPr algn="ctr"/>
-                <a:endParaRPr lang="en-AU"/>
-              </a:p>
-            </p:txBody>
-          </p:sp>
-        </p:grpSp>
-      </p:grpSp>
-      <p:grpSp>
-        <p:nvGrpSpPr>
-          <p:cNvPr id="2" name="Group 1">
-            <a:extLst>
-              <a:ext uri="{FF2B5EF4-FFF2-40B4-BE49-F238E27FC236}">
-                <a16:creationId xmlns:a16="http://schemas.microsoft.com/office/drawing/2014/main" id="{B5E1E581-C1F4-4EE6-ACFB-A1E5B0BEBFC0}"/>
-              </a:ext>
-            </a:extLst>
-          </p:cNvPr>
-          <p:cNvGrpSpPr/>
-          <p:nvPr/>
-        </p:nvGrpSpPr>
-        <p:grpSpPr>
-          <a:xfrm>
-            <a:off x="6459838" y="3275885"/>
-            <a:ext cx="2696400" cy="1400236"/>
-            <a:chOff x="6459838" y="3275885"/>
-            <a:chExt cx="2696400" cy="1400236"/>
-          </a:xfrm>
-        </p:grpSpPr>
-        <p:pic>
-          <p:nvPicPr>
-            <p:cNvPr id="18" name="Picture 17">
-              <a:extLst>
-                <a:ext uri="{FF2B5EF4-FFF2-40B4-BE49-F238E27FC236}">
-                  <a16:creationId xmlns:a16="http://schemas.microsoft.com/office/drawing/2014/main" id="{75CF6350-8E73-4AF8-801A-BE4DFD1AAF25}"/>
-                </a:ext>
-              </a:extLst>
-            </p:cNvPr>
-            <p:cNvPicPr>
-              <a:picLocks noChangeAspect="1"/>
-            </p:cNvPicPr>
-            <p:nvPr/>
-          </p:nvPicPr>
-          <p:blipFill>
-            <a:blip r:embed="rId9"/>
-            <a:stretch>
-              <a:fillRect/>
-            </a:stretch>
-          </p:blipFill>
-          <p:spPr>
-            <a:xfrm>
-              <a:off x="6459838" y="3275885"/>
-              <a:ext cx="2696400" cy="1400236"/>
             </a:xfrm>
             <a:prstGeom prst="rect">
               <a:avLst/>
@@ -24176,10 +24041,10 @@
         </p:pic>
         <p:sp>
           <p:nvSpPr>
-            <p:cNvPr id="13" name="Rectangle 12">
+            <p:cNvPr id="15" name="Rectangle 14">
               <a:extLst>
                 <a:ext uri="{FF2B5EF4-FFF2-40B4-BE49-F238E27FC236}">
-                  <a16:creationId xmlns:a16="http://schemas.microsoft.com/office/drawing/2014/main" id="{1B381E0A-03CA-4181-AB44-F6328FF35E03}"/>
+                  <a16:creationId xmlns:a16="http://schemas.microsoft.com/office/drawing/2014/main" id="{B61BD2AD-78CF-41A9-990F-9647F8FE8217}"/>
                 </a:ext>
               </a:extLst>
             </p:cNvPr>
@@ -24188,18 +24053,14 @@
           </p:nvSpPr>
           <p:spPr>
             <a:xfrm>
-              <a:off x="6581783" y="3684973"/>
-              <a:ext cx="948102" cy="871200"/>
+              <a:off x="6071508" y="5392893"/>
+              <a:ext cx="410936" cy="158822"/>
             </a:xfrm>
             <a:prstGeom prst="rect">
               <a:avLst/>
             </a:prstGeom>
-            <a:solidFill>
-              <a:srgbClr val="FFFFFF"/>
-            </a:solidFill>
-            <a:ln>
-              <a:noFill/>
-            </a:ln>
+            <a:noFill/>
+            <a:ln w="3175"/>
           </p:spPr>
           <p:style>
             <a:lnRef idx="2">
@@ -24242,14 +24103,14 @@
           <p:nvPr/>
         </p:nvPicPr>
         <p:blipFill>
-          <a:blip r:embed="rId10"/>
+          <a:blip r:embed="rId9"/>
           <a:stretch>
             <a:fillRect/>
           </a:stretch>
         </p:blipFill>
         <p:spPr>
           <a:xfrm>
-            <a:off x="2835136" y="3958990"/>
+            <a:off x="5537367" y="4713173"/>
             <a:ext cx="3565378" cy="1552575"/>
           </a:xfrm>
           <a:prstGeom prst="rect">
@@ -24262,6 +24123,794 @@
           </a:ln>
         </p:spPr>
       </p:pic>
+      <p:sp>
+        <p:nvSpPr>
+          <p:cNvPr id="3" name="Rectangle: Rounded Corners 2">
+            <a:extLst>
+              <a:ext uri="{FF2B5EF4-FFF2-40B4-BE49-F238E27FC236}">
+                <a16:creationId xmlns:a16="http://schemas.microsoft.com/office/drawing/2014/main" id="{341FFA62-A14E-47EB-AE56-C6B27D210DB0}"/>
+              </a:ext>
+            </a:extLst>
+          </p:cNvPr>
+          <p:cNvSpPr/>
+          <p:nvPr/>
+        </p:nvSpPr>
+        <p:spPr>
+          <a:xfrm>
+            <a:off x="5695952" y="3039000"/>
+            <a:ext cx="410936" cy="158822"/>
+          </a:xfrm>
+          <a:prstGeom prst="roundRect">
+            <a:avLst/>
+          </a:prstGeom>
+          <a:noFill/>
+          <a:ln w="28575">
+            <a:solidFill>
+              <a:srgbClr val="C00000"/>
+            </a:solidFill>
+          </a:ln>
+        </p:spPr>
+        <p:style>
+          <a:lnRef idx="2">
+            <a:schemeClr val="accent1">
+              <a:shade val="50000"/>
+            </a:schemeClr>
+          </a:lnRef>
+          <a:fillRef idx="1">
+            <a:schemeClr val="accent1"/>
+          </a:fillRef>
+          <a:effectRef idx="0">
+            <a:schemeClr val="accent1"/>
+          </a:effectRef>
+          <a:fontRef idx="minor">
+            <a:schemeClr val="lt1"/>
+          </a:fontRef>
+        </p:style>
+        <p:txBody>
+          <a:bodyPr rtlCol="0" anchor="ctr"/>
+          <a:lstStyle/>
+          <a:p>
+            <a:pPr algn="ctr"/>
+            <a:endParaRPr lang="en-AU"/>
+          </a:p>
+        </p:txBody>
+      </p:sp>
+      <p:pic>
+        <p:nvPicPr>
+          <p:cNvPr id="10" name="Picture 9">
+            <a:extLst>
+              <a:ext uri="{FF2B5EF4-FFF2-40B4-BE49-F238E27FC236}">
+                <a16:creationId xmlns:a16="http://schemas.microsoft.com/office/drawing/2014/main" id="{47209B11-D427-4A0C-9F9D-3BA3620E2D03}"/>
+              </a:ext>
+            </a:extLst>
+          </p:cNvPr>
+          <p:cNvPicPr>
+            <a:picLocks noChangeAspect="1"/>
+          </p:cNvPicPr>
+          <p:nvPr/>
+        </p:nvPicPr>
+        <p:blipFill>
+          <a:blip r:embed="rId10"/>
+          <a:stretch>
+            <a:fillRect/>
+          </a:stretch>
+        </p:blipFill>
+        <p:spPr>
+          <a:xfrm>
+            <a:off x="4233308" y="1523779"/>
+            <a:ext cx="801858" cy="1993809"/>
+          </a:xfrm>
+          <a:prstGeom prst="rect">
+            <a:avLst/>
+          </a:prstGeom>
+        </p:spPr>
+      </p:pic>
+      <p:sp>
+        <p:nvSpPr>
+          <p:cNvPr id="20" name="Rectangle: Rounded Corners 19">
+            <a:extLst>
+              <a:ext uri="{FF2B5EF4-FFF2-40B4-BE49-F238E27FC236}">
+                <a16:creationId xmlns:a16="http://schemas.microsoft.com/office/drawing/2014/main" id="{824A5D63-2B33-4679-BEFA-E8CE1030D8B1}"/>
+              </a:ext>
+            </a:extLst>
+          </p:cNvPr>
+          <p:cNvSpPr/>
+          <p:nvPr/>
+        </p:nvSpPr>
+        <p:spPr>
+          <a:xfrm>
+            <a:off x="4437597" y="3259612"/>
+            <a:ext cx="255159" cy="119325"/>
+          </a:xfrm>
+          <a:prstGeom prst="roundRect">
+            <a:avLst/>
+          </a:prstGeom>
+          <a:noFill/>
+          <a:ln w="28575">
+            <a:solidFill>
+              <a:srgbClr val="C00000"/>
+            </a:solidFill>
+          </a:ln>
+        </p:spPr>
+        <p:style>
+          <a:lnRef idx="2">
+            <a:schemeClr val="accent1">
+              <a:shade val="50000"/>
+            </a:schemeClr>
+          </a:lnRef>
+          <a:fillRef idx="1">
+            <a:schemeClr val="accent1"/>
+          </a:fillRef>
+          <a:effectRef idx="0">
+            <a:schemeClr val="accent1"/>
+          </a:effectRef>
+          <a:fontRef idx="minor">
+            <a:schemeClr val="lt1"/>
+          </a:fontRef>
+        </p:style>
+        <p:txBody>
+          <a:bodyPr rtlCol="0" anchor="ctr"/>
+          <a:lstStyle/>
+          <a:p>
+            <a:pPr algn="ctr"/>
+            <a:endParaRPr lang="en-AU"/>
+          </a:p>
+        </p:txBody>
+      </p:sp>
+      <p:sp>
+        <p:nvSpPr>
+          <p:cNvPr id="21" name="Rectangle 20">
+            <a:extLst>
+              <a:ext uri="{FF2B5EF4-FFF2-40B4-BE49-F238E27FC236}">
+                <a16:creationId xmlns:a16="http://schemas.microsoft.com/office/drawing/2014/main" id="{99906F8A-A3FF-4CA4-A9E0-562EE0ECD7E8}"/>
+              </a:ext>
+            </a:extLst>
+          </p:cNvPr>
+          <p:cNvSpPr/>
+          <p:nvPr/>
+        </p:nvSpPr>
+        <p:spPr>
+          <a:xfrm>
+            <a:off x="7320056" y="3698465"/>
+            <a:ext cx="288000" cy="144384"/>
+          </a:xfrm>
+          <a:prstGeom prst="rect">
+            <a:avLst/>
+          </a:prstGeom>
+          <a:noFill/>
+          <a:ln w="28575">
+            <a:solidFill>
+              <a:srgbClr val="C00000"/>
+            </a:solidFill>
+          </a:ln>
+        </p:spPr>
+        <p:style>
+          <a:lnRef idx="2">
+            <a:schemeClr val="accent1">
+              <a:shade val="50000"/>
+            </a:schemeClr>
+          </a:lnRef>
+          <a:fillRef idx="1">
+            <a:schemeClr val="accent1"/>
+          </a:fillRef>
+          <a:effectRef idx="0">
+            <a:schemeClr val="accent1"/>
+          </a:effectRef>
+          <a:fontRef idx="minor">
+            <a:schemeClr val="lt1"/>
+          </a:fontRef>
+        </p:style>
+        <p:txBody>
+          <a:bodyPr rtlCol="0" anchor="ctr"/>
+          <a:lstStyle/>
+          <a:p>
+            <a:pPr algn="ctr"/>
+            <a:endParaRPr lang="en-AU"/>
+          </a:p>
+        </p:txBody>
+      </p:sp>
+      <p:sp>
+        <p:nvSpPr>
+          <p:cNvPr id="28" name="Rectangle 27">
+            <a:extLst>
+              <a:ext uri="{FF2B5EF4-FFF2-40B4-BE49-F238E27FC236}">
+                <a16:creationId xmlns:a16="http://schemas.microsoft.com/office/drawing/2014/main" id="{BA1E258C-E69F-4C0E-BCCD-86708F944A3F}"/>
+              </a:ext>
+            </a:extLst>
+          </p:cNvPr>
+          <p:cNvSpPr/>
+          <p:nvPr/>
+        </p:nvSpPr>
+        <p:spPr>
+          <a:xfrm>
+            <a:off x="7320056" y="3961738"/>
+            <a:ext cx="684000" cy="144384"/>
+          </a:xfrm>
+          <a:prstGeom prst="rect">
+            <a:avLst/>
+          </a:prstGeom>
+          <a:noFill/>
+          <a:ln w="28575">
+            <a:solidFill>
+              <a:srgbClr val="C00000"/>
+            </a:solidFill>
+          </a:ln>
+        </p:spPr>
+        <p:style>
+          <a:lnRef idx="2">
+            <a:schemeClr val="accent1">
+              <a:shade val="50000"/>
+            </a:schemeClr>
+          </a:lnRef>
+          <a:fillRef idx="1">
+            <a:schemeClr val="accent1"/>
+          </a:fillRef>
+          <a:effectRef idx="0">
+            <a:schemeClr val="accent1"/>
+          </a:effectRef>
+          <a:fontRef idx="minor">
+            <a:schemeClr val="lt1"/>
+          </a:fontRef>
+        </p:style>
+        <p:txBody>
+          <a:bodyPr rtlCol="0" anchor="ctr"/>
+          <a:lstStyle/>
+          <a:p>
+            <a:pPr algn="ctr"/>
+            <a:endParaRPr lang="en-AU"/>
+          </a:p>
+        </p:txBody>
+      </p:sp>
+      <p:sp>
+        <p:nvSpPr>
+          <p:cNvPr id="29" name="Rectangle 28">
+            <a:extLst>
+              <a:ext uri="{FF2B5EF4-FFF2-40B4-BE49-F238E27FC236}">
+                <a16:creationId xmlns:a16="http://schemas.microsoft.com/office/drawing/2014/main" id="{B3CF8A04-6B57-4599-BF7B-0A7ADF118509}"/>
+              </a:ext>
+            </a:extLst>
+          </p:cNvPr>
+          <p:cNvSpPr/>
+          <p:nvPr/>
+        </p:nvSpPr>
+        <p:spPr>
+          <a:xfrm>
+            <a:off x="8414196" y="3690650"/>
+            <a:ext cx="565289" cy="174704"/>
+          </a:xfrm>
+          <a:prstGeom prst="rect">
+            <a:avLst/>
+          </a:prstGeom>
+          <a:noFill/>
+          <a:ln w="28575">
+            <a:solidFill>
+              <a:srgbClr val="C00000"/>
+            </a:solidFill>
+          </a:ln>
+        </p:spPr>
+        <p:style>
+          <a:lnRef idx="2">
+            <a:schemeClr val="accent1">
+              <a:shade val="50000"/>
+            </a:schemeClr>
+          </a:lnRef>
+          <a:fillRef idx="1">
+            <a:schemeClr val="accent1"/>
+          </a:fillRef>
+          <a:effectRef idx="0">
+            <a:schemeClr val="accent1"/>
+          </a:effectRef>
+          <a:fontRef idx="minor">
+            <a:schemeClr val="lt1"/>
+          </a:fontRef>
+        </p:style>
+        <p:txBody>
+          <a:bodyPr rtlCol="0" anchor="ctr"/>
+          <a:lstStyle/>
+          <a:p>
+            <a:pPr algn="ctr"/>
+            <a:endParaRPr lang="en-AU"/>
+          </a:p>
+        </p:txBody>
+      </p:sp>
+      <p:sp>
+        <p:nvSpPr>
+          <p:cNvPr id="33" name="Rectangle 32">
+            <a:extLst>
+              <a:ext uri="{FF2B5EF4-FFF2-40B4-BE49-F238E27FC236}">
+                <a16:creationId xmlns:a16="http://schemas.microsoft.com/office/drawing/2014/main" id="{FBEF3397-7DF3-42A9-A681-C8B1ECDC9FB4}"/>
+              </a:ext>
+            </a:extLst>
+          </p:cNvPr>
+          <p:cNvSpPr/>
+          <p:nvPr/>
+        </p:nvSpPr>
+        <p:spPr>
+          <a:xfrm>
+            <a:off x="5530388" y="4891559"/>
+            <a:ext cx="1476000" cy="180000"/>
+          </a:xfrm>
+          <a:prstGeom prst="rect">
+            <a:avLst/>
+          </a:prstGeom>
+          <a:noFill/>
+          <a:ln w="28575">
+            <a:solidFill>
+              <a:srgbClr val="FFFF00"/>
+            </a:solidFill>
+          </a:ln>
+        </p:spPr>
+        <p:style>
+          <a:lnRef idx="2">
+            <a:schemeClr val="accent1">
+              <a:shade val="50000"/>
+            </a:schemeClr>
+          </a:lnRef>
+          <a:fillRef idx="1">
+            <a:schemeClr val="accent1"/>
+          </a:fillRef>
+          <a:effectRef idx="0">
+            <a:schemeClr val="accent1"/>
+          </a:effectRef>
+          <a:fontRef idx="minor">
+            <a:schemeClr val="lt1"/>
+          </a:fontRef>
+        </p:style>
+        <p:txBody>
+          <a:bodyPr rtlCol="0" anchor="ctr"/>
+          <a:lstStyle/>
+          <a:p>
+            <a:pPr algn="ctr"/>
+            <a:endParaRPr lang="en-AU"/>
+          </a:p>
+        </p:txBody>
+      </p:sp>
+      <p:sp>
+        <p:nvSpPr>
+          <p:cNvPr id="12" name="Rectangle 11">
+            <a:extLst>
+              <a:ext uri="{FF2B5EF4-FFF2-40B4-BE49-F238E27FC236}">
+                <a16:creationId xmlns:a16="http://schemas.microsoft.com/office/drawing/2014/main" id="{987B9E71-55A4-41D9-9A9E-B6730CA90042}"/>
+              </a:ext>
+            </a:extLst>
+          </p:cNvPr>
+          <p:cNvSpPr/>
+          <p:nvPr/>
+        </p:nvSpPr>
+        <p:spPr>
+          <a:xfrm>
+            <a:off x="6486770" y="3046815"/>
+            <a:ext cx="1172307" cy="158822"/>
+          </a:xfrm>
+          <a:prstGeom prst="rect">
+            <a:avLst/>
+          </a:prstGeom>
+          <a:solidFill>
+            <a:srgbClr val="FFFFFF"/>
+          </a:solidFill>
+          <a:ln>
+            <a:noFill/>
+          </a:ln>
+        </p:spPr>
+        <p:style>
+          <a:lnRef idx="2">
+            <a:schemeClr val="accent1">
+              <a:shade val="50000"/>
+            </a:schemeClr>
+          </a:lnRef>
+          <a:fillRef idx="1">
+            <a:schemeClr val="accent1"/>
+          </a:fillRef>
+          <a:effectRef idx="0">
+            <a:schemeClr val="accent1"/>
+          </a:effectRef>
+          <a:fontRef idx="minor">
+            <a:schemeClr val="lt1"/>
+          </a:fontRef>
+        </p:style>
+        <p:txBody>
+          <a:bodyPr rtlCol="0" anchor="ctr"/>
+          <a:lstStyle/>
+          <a:p>
+            <a:pPr algn="ctr"/>
+            <a:endParaRPr lang="en-AU"/>
+          </a:p>
+        </p:txBody>
+      </p:sp>
+      <p:pic>
+        <p:nvPicPr>
+          <p:cNvPr id="34" name="Picture 33">
+            <a:extLst>
+              <a:ext uri="{FF2B5EF4-FFF2-40B4-BE49-F238E27FC236}">
+                <a16:creationId xmlns:a16="http://schemas.microsoft.com/office/drawing/2014/main" id="{DCC54DB2-07DF-4F7C-A932-209F6E74E324}"/>
+              </a:ext>
+            </a:extLst>
+          </p:cNvPr>
+          <p:cNvPicPr>
+            <a:picLocks noChangeAspect="1"/>
+          </p:cNvPicPr>
+          <p:nvPr/>
+        </p:nvPicPr>
+        <p:blipFill>
+          <a:blip r:embed="rId11"/>
+          <a:stretch>
+            <a:fillRect/>
+          </a:stretch>
+        </p:blipFill>
+        <p:spPr>
+          <a:xfrm>
+            <a:off x="5118340" y="3662690"/>
+            <a:ext cx="1149526" cy="504762"/>
+          </a:xfrm>
+          <a:prstGeom prst="rect">
+            <a:avLst/>
+          </a:prstGeom>
+        </p:spPr>
+      </p:pic>
+      <p:sp>
+        <p:nvSpPr>
+          <p:cNvPr id="35" name="Rectangle 34">
+            <a:extLst>
+              <a:ext uri="{FF2B5EF4-FFF2-40B4-BE49-F238E27FC236}">
+                <a16:creationId xmlns:a16="http://schemas.microsoft.com/office/drawing/2014/main" id="{38BC95DB-7D35-43B7-9227-D56CF3F7CE6F}"/>
+              </a:ext>
+            </a:extLst>
+          </p:cNvPr>
+          <p:cNvSpPr/>
+          <p:nvPr/>
+        </p:nvSpPr>
+        <p:spPr>
+          <a:xfrm>
+            <a:off x="5369434" y="3857539"/>
+            <a:ext cx="432000" cy="144384"/>
+          </a:xfrm>
+          <a:prstGeom prst="rect">
+            <a:avLst/>
+          </a:prstGeom>
+          <a:noFill/>
+          <a:ln w="28575">
+            <a:solidFill>
+              <a:srgbClr val="C00000"/>
+            </a:solidFill>
+          </a:ln>
+        </p:spPr>
+        <p:style>
+          <a:lnRef idx="2">
+            <a:schemeClr val="accent1">
+              <a:shade val="50000"/>
+            </a:schemeClr>
+          </a:lnRef>
+          <a:fillRef idx="1">
+            <a:schemeClr val="accent1"/>
+          </a:fillRef>
+          <a:effectRef idx="0">
+            <a:schemeClr val="accent1"/>
+          </a:effectRef>
+          <a:fontRef idx="minor">
+            <a:schemeClr val="lt1"/>
+          </a:fontRef>
+        </p:style>
+        <p:txBody>
+          <a:bodyPr rtlCol="0" anchor="ctr"/>
+          <a:lstStyle/>
+          <a:p>
+            <a:pPr algn="ctr"/>
+            <a:endParaRPr lang="en-AU"/>
+          </a:p>
+        </p:txBody>
+      </p:sp>
+      <p:sp>
+        <p:nvSpPr>
+          <p:cNvPr id="38" name="Rectangle 37">
+            <a:extLst>
+              <a:ext uri="{FF2B5EF4-FFF2-40B4-BE49-F238E27FC236}">
+                <a16:creationId xmlns:a16="http://schemas.microsoft.com/office/drawing/2014/main" id="{7E9E4A77-655D-4739-809E-B7ACDC9EDAC9}"/>
+              </a:ext>
+            </a:extLst>
+          </p:cNvPr>
+          <p:cNvSpPr/>
+          <p:nvPr/>
+        </p:nvSpPr>
+        <p:spPr>
+          <a:xfrm>
+            <a:off x="9339388" y="3751386"/>
+            <a:ext cx="945062" cy="859692"/>
+          </a:xfrm>
+          <a:prstGeom prst="rect">
+            <a:avLst/>
+          </a:prstGeom>
+          <a:solidFill>
+            <a:srgbClr val="FFFFFF"/>
+          </a:solidFill>
+          <a:ln>
+            <a:noFill/>
+          </a:ln>
+        </p:spPr>
+        <p:style>
+          <a:lnRef idx="2">
+            <a:schemeClr val="accent1">
+              <a:shade val="50000"/>
+            </a:schemeClr>
+          </a:lnRef>
+          <a:fillRef idx="1">
+            <a:schemeClr val="accent1"/>
+          </a:fillRef>
+          <a:effectRef idx="0">
+            <a:schemeClr val="accent1"/>
+          </a:effectRef>
+          <a:fontRef idx="minor">
+            <a:schemeClr val="lt1"/>
+          </a:fontRef>
+        </p:style>
+        <p:txBody>
+          <a:bodyPr rtlCol="0" anchor="ctr"/>
+          <a:lstStyle/>
+          <a:p>
+            <a:pPr algn="ctr"/>
+            <a:endParaRPr lang="en-AU"/>
+          </a:p>
+        </p:txBody>
+      </p:sp>
+      <p:sp>
+        <p:nvSpPr>
+          <p:cNvPr id="41" name="Rectangle 40">
+            <a:extLst>
+              <a:ext uri="{FF2B5EF4-FFF2-40B4-BE49-F238E27FC236}">
+                <a16:creationId xmlns:a16="http://schemas.microsoft.com/office/drawing/2014/main" id="{CEFAF503-4D83-4BFB-9CDA-813A320FFD50}"/>
+              </a:ext>
+            </a:extLst>
+          </p:cNvPr>
+          <p:cNvSpPr/>
+          <p:nvPr/>
+        </p:nvSpPr>
+        <p:spPr>
+          <a:xfrm>
+            <a:off x="9312861" y="3496247"/>
+            <a:ext cx="828000" cy="174704"/>
+          </a:xfrm>
+          <a:prstGeom prst="rect">
+            <a:avLst/>
+          </a:prstGeom>
+          <a:noFill/>
+          <a:ln w="28575">
+            <a:solidFill>
+              <a:srgbClr val="C00000"/>
+            </a:solidFill>
+          </a:ln>
+        </p:spPr>
+        <p:style>
+          <a:lnRef idx="2">
+            <a:schemeClr val="accent1">
+              <a:shade val="50000"/>
+            </a:schemeClr>
+          </a:lnRef>
+          <a:fillRef idx="1">
+            <a:schemeClr val="accent1"/>
+          </a:fillRef>
+          <a:effectRef idx="0">
+            <a:schemeClr val="accent1"/>
+          </a:effectRef>
+          <a:fontRef idx="minor">
+            <a:schemeClr val="lt1"/>
+          </a:fontRef>
+        </p:style>
+        <p:txBody>
+          <a:bodyPr rtlCol="0" anchor="ctr"/>
+          <a:lstStyle/>
+          <a:p>
+            <a:pPr algn="ctr"/>
+            <a:endParaRPr lang="en-AU"/>
+          </a:p>
+        </p:txBody>
+      </p:sp>
+      <p:sp>
+        <p:nvSpPr>
+          <p:cNvPr id="42" name="Rectangle 41">
+            <a:extLst>
+              <a:ext uri="{FF2B5EF4-FFF2-40B4-BE49-F238E27FC236}">
+                <a16:creationId xmlns:a16="http://schemas.microsoft.com/office/drawing/2014/main" id="{8152F327-1A76-437B-B7B5-DAB46E72B900}"/>
+              </a:ext>
+            </a:extLst>
+          </p:cNvPr>
+          <p:cNvSpPr/>
+          <p:nvPr/>
+        </p:nvSpPr>
+        <p:spPr>
+          <a:xfrm>
+            <a:off x="9323757" y="2550966"/>
+            <a:ext cx="684000" cy="174704"/>
+          </a:xfrm>
+          <a:prstGeom prst="rect">
+            <a:avLst/>
+          </a:prstGeom>
+          <a:noFill/>
+          <a:ln w="28575">
+            <a:solidFill>
+              <a:srgbClr val="C00000"/>
+            </a:solidFill>
+          </a:ln>
+        </p:spPr>
+        <p:style>
+          <a:lnRef idx="2">
+            <a:schemeClr val="accent1">
+              <a:shade val="50000"/>
+            </a:schemeClr>
+          </a:lnRef>
+          <a:fillRef idx="1">
+            <a:schemeClr val="accent1"/>
+          </a:fillRef>
+          <a:effectRef idx="0">
+            <a:schemeClr val="accent1"/>
+          </a:effectRef>
+          <a:fontRef idx="minor">
+            <a:schemeClr val="lt1"/>
+          </a:fontRef>
+        </p:style>
+        <p:txBody>
+          <a:bodyPr rtlCol="0" anchor="ctr"/>
+          <a:lstStyle/>
+          <a:p>
+            <a:pPr algn="ctr"/>
+            <a:endParaRPr lang="en-AU"/>
+          </a:p>
+        </p:txBody>
+      </p:sp>
+      <p:sp>
+        <p:nvSpPr>
+          <p:cNvPr id="43" name="Rectangle 42">
+            <a:extLst>
+              <a:ext uri="{FF2B5EF4-FFF2-40B4-BE49-F238E27FC236}">
+                <a16:creationId xmlns:a16="http://schemas.microsoft.com/office/drawing/2014/main" id="{F85B50FC-DBD1-4E91-BE94-A1AE71BA8922}"/>
+              </a:ext>
+            </a:extLst>
+          </p:cNvPr>
+          <p:cNvSpPr/>
+          <p:nvPr/>
+        </p:nvSpPr>
+        <p:spPr>
+          <a:xfrm>
+            <a:off x="11238731" y="2558781"/>
+            <a:ext cx="180000" cy="174704"/>
+          </a:xfrm>
+          <a:prstGeom prst="rect">
+            <a:avLst/>
+          </a:prstGeom>
+          <a:noFill/>
+          <a:ln w="28575">
+            <a:solidFill>
+              <a:srgbClr val="C00000"/>
+            </a:solidFill>
+          </a:ln>
+        </p:spPr>
+        <p:style>
+          <a:lnRef idx="2">
+            <a:schemeClr val="accent1">
+              <a:shade val="50000"/>
+            </a:schemeClr>
+          </a:lnRef>
+          <a:fillRef idx="1">
+            <a:schemeClr val="accent1"/>
+          </a:fillRef>
+          <a:effectRef idx="0">
+            <a:schemeClr val="accent1"/>
+          </a:effectRef>
+          <a:fontRef idx="minor">
+            <a:schemeClr val="lt1"/>
+          </a:fontRef>
+        </p:style>
+        <p:txBody>
+          <a:bodyPr rtlCol="0" anchor="ctr"/>
+          <a:lstStyle/>
+          <a:p>
+            <a:pPr algn="ctr"/>
+            <a:endParaRPr lang="en-AU"/>
+          </a:p>
+        </p:txBody>
+      </p:sp>
+      <p:sp>
+        <p:nvSpPr>
+          <p:cNvPr id="44" name="Rectangle 43">
+            <a:extLst>
+              <a:ext uri="{FF2B5EF4-FFF2-40B4-BE49-F238E27FC236}">
+                <a16:creationId xmlns:a16="http://schemas.microsoft.com/office/drawing/2014/main" id="{C50A68E2-9165-4689-AF5A-D5E094B51D14}"/>
+              </a:ext>
+            </a:extLst>
+          </p:cNvPr>
+          <p:cNvSpPr/>
+          <p:nvPr/>
+        </p:nvSpPr>
+        <p:spPr>
+          <a:xfrm>
+            <a:off x="11278226" y="4007623"/>
+            <a:ext cx="565289" cy="174704"/>
+          </a:xfrm>
+          <a:prstGeom prst="rect">
+            <a:avLst/>
+          </a:prstGeom>
+          <a:noFill/>
+          <a:ln w="28575">
+            <a:solidFill>
+              <a:srgbClr val="C00000"/>
+            </a:solidFill>
+          </a:ln>
+        </p:spPr>
+        <p:style>
+          <a:lnRef idx="2">
+            <a:schemeClr val="accent1">
+              <a:shade val="50000"/>
+            </a:schemeClr>
+          </a:lnRef>
+          <a:fillRef idx="1">
+            <a:schemeClr val="accent1"/>
+          </a:fillRef>
+          <a:effectRef idx="0">
+            <a:schemeClr val="accent1"/>
+          </a:effectRef>
+          <a:fontRef idx="minor">
+            <a:schemeClr val="lt1"/>
+          </a:fontRef>
+        </p:style>
+        <p:txBody>
+          <a:bodyPr rtlCol="0" anchor="ctr"/>
+          <a:lstStyle/>
+          <a:p>
+            <a:pPr algn="ctr"/>
+            <a:endParaRPr lang="en-AU"/>
+          </a:p>
+        </p:txBody>
+      </p:sp>
+      <p:sp>
+        <p:nvSpPr>
+          <p:cNvPr id="46" name="Rectangle 45">
+            <a:extLst>
+              <a:ext uri="{FF2B5EF4-FFF2-40B4-BE49-F238E27FC236}">
+                <a16:creationId xmlns:a16="http://schemas.microsoft.com/office/drawing/2014/main" id="{3816C2A6-7AFA-4098-B79C-FAAB616B6810}"/>
+              </a:ext>
+            </a:extLst>
+          </p:cNvPr>
+          <p:cNvSpPr/>
+          <p:nvPr/>
+        </p:nvSpPr>
+        <p:spPr>
+          <a:xfrm>
+            <a:off x="10332343" y="5447658"/>
+            <a:ext cx="756000" cy="174704"/>
+          </a:xfrm>
+          <a:prstGeom prst="rect">
+            <a:avLst/>
+          </a:prstGeom>
+          <a:noFill/>
+          <a:ln w="28575">
+            <a:solidFill>
+              <a:srgbClr val="C00000"/>
+            </a:solidFill>
+          </a:ln>
+        </p:spPr>
+        <p:style>
+          <a:lnRef idx="2">
+            <a:schemeClr val="accent1">
+              <a:shade val="50000"/>
+            </a:schemeClr>
+          </a:lnRef>
+          <a:fillRef idx="1">
+            <a:schemeClr val="accent1"/>
+          </a:fillRef>
+          <a:effectRef idx="0">
+            <a:schemeClr val="accent1"/>
+          </a:effectRef>
+          <a:fontRef idx="minor">
+            <a:schemeClr val="lt1"/>
+          </a:fontRef>
+        </p:style>
+        <p:txBody>
+          <a:bodyPr rtlCol="0" anchor="ctr"/>
+          <a:lstStyle/>
+          <a:p>
+            <a:pPr algn="ctr"/>
+            <a:endParaRPr lang="en-AU"/>
+          </a:p>
+        </p:txBody>
+      </p:sp>
     </p:spTree>
     <p:custDataLst>
       <p:tags r:id="rId1"/>
@@ -24275,11 +24924,11 @@
   <p:clrMapOvr>
     <a:masterClrMapping/>
   </p:clrMapOvr>
-  <mc:AlternateContent xmlns:mc="http://schemas.openxmlformats.org/markup-compatibility/2006">
-    <mc:Choice xmlns:p14="http://schemas.microsoft.com/office/powerpoint/2010/main" Requires="p14">
+  <mc:AlternateContent xmlns:mc="http://schemas.openxmlformats.org/markup-compatibility/2006" xmlns:p14="http://schemas.microsoft.com/office/powerpoint/2010/main">
+    <mc:Choice Requires="p14">
       <p:transition spd="slow" p14:dur="2000" advTm="35683"/>
     </mc:Choice>
-    <mc:Fallback>
+    <mc:Fallback xmlns="">
       <p:transition spd="slow" advTm="35683"/>
     </mc:Fallback>
   </mc:AlternateContent>
@@ -24304,7 +24953,7 @@
                             </p:stCondLst>
                             <p:childTnLst>
                               <p:par>
-                                <p:cTn id="5" presetID="10" presetClass="entr" presetSubtype="0" fill="hold" nodeType="clickEffect">
+                                <p:cTn id="5" presetID="22" presetClass="entr" presetSubtype="4" fill="hold" grpId="0" nodeType="clickEffect">
                                   <p:stCondLst>
                                     <p:cond delay="0"/>
                                   </p:stCondLst>
@@ -24317,11 +24966,7 @@
                                           </p:stCondLst>
                                         </p:cTn>
                                         <p:tgtEl>
-                                          <p:spTgt spid="5">
-                                            <p:txEl>
-                                              <p:pRg st="2" end="2"/>
-                                            </p:txEl>
-                                          </p:spTgt>
+                                          <p:spTgt spid="5"/>
                                         </p:tgtEl>
                                         <p:attrNameLst>
                                           <p:attrName>style.visibility</p:attrName>
@@ -24331,15 +24976,11 @@
                                         <p:strVal val="visible"/>
                                       </p:to>
                                     </p:set>
-                                    <p:animEffect transition="in" filter="fade">
+                                    <p:animEffect transition="in" filter="wipe(down)">
                                       <p:cBhvr>
                                         <p:cTn id="7" dur="500"/>
                                         <p:tgtEl>
-                                          <p:spTgt spid="5">
-                                            <p:txEl>
-                                              <p:pRg st="2" end="2"/>
-                                            </p:txEl>
-                                          </p:spTgt>
+                                          <p:spTgt spid="5"/>
                                         </p:tgtEl>
                                       </p:cBhvr>
                                     </p:animEffect>
@@ -24378,11 +25019,7 @@
                                           </p:stCondLst>
                                         </p:cTn>
                                         <p:tgtEl>
-                                          <p:spTgt spid="5">
-                                            <p:txEl>
-                                              <p:pRg st="3" end="3"/>
-                                            </p:txEl>
-                                          </p:spTgt>
+                                          <p:spTgt spid="10"/>
                                         </p:tgtEl>
                                         <p:attrNameLst>
                                           <p:attrName>style.visibility</p:attrName>
@@ -24396,11 +25033,7 @@
                                       <p:cBhvr>
                                         <p:cTn id="12" dur="500"/>
                                         <p:tgtEl>
-                                          <p:spTgt spid="5">
-                                            <p:txEl>
-                                              <p:pRg st="3" end="3"/>
-                                            </p:txEl>
-                                          </p:spTgt>
+                                          <p:spTgt spid="10"/>
                                         </p:tgtEl>
                                       </p:cBhvr>
                                     </p:animEffect>
@@ -24426,7 +25059,7 @@
                             </p:stCondLst>
                             <p:childTnLst>
                               <p:par>
-                                <p:cTn id="15" presetID="10" presetClass="entr" presetSubtype="0" fill="hold" nodeType="clickEffect">
+                                <p:cTn id="15" presetID="45" presetClass="entr" presetSubtype="0" fill="hold" grpId="0" nodeType="clickEffect">
                                   <p:stCondLst>
                                     <p:cond delay="0"/>
                                   </p:stCondLst>
@@ -24439,7 +25072,7 @@
                                           </p:stCondLst>
                                         </p:cTn>
                                         <p:tgtEl>
-                                          <p:spTgt spid="7"/>
+                                          <p:spTgt spid="20"/>
                                         </p:tgtEl>
                                         <p:attrNameLst>
                                           <p:attrName>style.visibility</p:attrName>
@@ -24451,9 +25084,108 @@
                                     </p:set>
                                     <p:animEffect transition="in" filter="fade">
                                       <p:cBhvr>
-                                        <p:cTn id="17" dur="500"/>
+                                        <p:cTn id="17" dur="2000"/>
                                         <p:tgtEl>
-                                          <p:spTgt spid="7"/>
+                                          <p:spTgt spid="20"/>
+                                        </p:tgtEl>
+                                      </p:cBhvr>
+                                    </p:animEffect>
+                                    <p:anim calcmode="lin" valueType="num">
+                                      <p:cBhvr>
+                                        <p:cTn id="18" dur="2000" fill="hold"/>
+                                        <p:tgtEl>
+                                          <p:spTgt spid="20"/>
+                                        </p:tgtEl>
+                                        <p:attrNameLst>
+                                          <p:attrName>ppt_w</p:attrName>
+                                        </p:attrNameLst>
+                                      </p:cBhvr>
+                                      <p:tavLst>
+                                        <p:tav tm="0" fmla="#ppt_w*sin(2.5*pi*$)">
+                                          <p:val>
+                                            <p:fltVal val="0"/>
+                                          </p:val>
+                                        </p:tav>
+                                        <p:tav tm="100000">
+                                          <p:val>
+                                            <p:fltVal val="1"/>
+                                          </p:val>
+                                        </p:tav>
+                                      </p:tavLst>
+                                    </p:anim>
+                                    <p:anim calcmode="lin" valueType="num">
+                                      <p:cBhvr>
+                                        <p:cTn id="19" dur="2000" fill="hold"/>
+                                        <p:tgtEl>
+                                          <p:spTgt spid="20"/>
+                                        </p:tgtEl>
+                                        <p:attrNameLst>
+                                          <p:attrName>ppt_h</p:attrName>
+                                        </p:attrNameLst>
+                                      </p:cBhvr>
+                                      <p:tavLst>
+                                        <p:tav tm="0">
+                                          <p:val>
+                                            <p:strVal val="#ppt_h"/>
+                                          </p:val>
+                                        </p:tav>
+                                        <p:tav tm="100000">
+                                          <p:val>
+                                            <p:strVal val="#ppt_h"/>
+                                          </p:val>
+                                        </p:tav>
+                                      </p:tavLst>
+                                    </p:anim>
+                                  </p:childTnLst>
+                                </p:cTn>
+                              </p:par>
+                            </p:childTnLst>
+                          </p:cTn>
+                        </p:par>
+                      </p:childTnLst>
+                    </p:cTn>
+                  </p:par>
+                  <p:par>
+                    <p:cTn id="20" fill="hold">
+                      <p:stCondLst>
+                        <p:cond delay="indefinite"/>
+                      </p:stCondLst>
+                      <p:childTnLst>
+                        <p:par>
+                          <p:cTn id="21" fill="hold">
+                            <p:stCondLst>
+                              <p:cond delay="0"/>
+                            </p:stCondLst>
+                            <p:childTnLst>
+                              <p:par>
+                                <p:cTn id="22" presetID="10" presetClass="entr" presetSubtype="0" fill="hold" nodeType="clickEffect">
+                                  <p:stCondLst>
+                                    <p:cond delay="0"/>
+                                  </p:stCondLst>
+                                  <p:childTnLst>
+                                    <p:set>
+                                      <p:cBhvr>
+                                        <p:cTn id="23" dur="1" fill="hold">
+                                          <p:stCondLst>
+                                            <p:cond delay="0"/>
+                                          </p:stCondLst>
+                                        </p:cTn>
+                                        <p:tgtEl>
+                                          <p:spTgt spid="16"/>
+                                        </p:tgtEl>
+                                        <p:attrNameLst>
+                                          <p:attrName>style.visibility</p:attrName>
+                                        </p:attrNameLst>
+                                      </p:cBhvr>
+                                      <p:to>
+                                        <p:strVal val="visible"/>
+                                      </p:to>
+                                    </p:set>
+                                    <p:animEffect transition="in" filter="fade">
+                                      <p:cBhvr>
+                                        <p:cTn id="24" dur="500"/>
+                                        <p:tgtEl>
+                                          <p:spTgt spid="16"/>
                                         </p:tgtEl>
                                       </p:cBhvr>
                                     </p:animEffect>
@@ -24467,36 +25199,32 @@
                     </p:cTn>
                   </p:par>
                   <p:par>
-                    <p:cTn id="18" fill="hold">
+                    <p:cTn id="25" fill="hold">
                       <p:stCondLst>
                         <p:cond delay="indefinite"/>
                       </p:stCondLst>
                       <p:childTnLst>
                         <p:par>
-                          <p:cTn id="19" fill="hold">
+                          <p:cTn id="26" fill="hold">
                             <p:stCondLst>
                               <p:cond delay="0"/>
                             </p:stCondLst>
                             <p:childTnLst>
                               <p:par>
-                                <p:cTn id="20" presetID="10" presetClass="entr" presetSubtype="0" fill="hold" nodeType="clickEffect">
+                                <p:cTn id="27" presetID="45" presetClass="entr" presetSubtype="0" fill="hold" grpId="0" nodeType="clickEffect">
                                   <p:stCondLst>
                                     <p:cond delay="0"/>
                                   </p:stCondLst>
                                   <p:childTnLst>
                                     <p:set>
                                       <p:cBhvr>
-                                        <p:cTn id="21" dur="1" fill="hold">
+                                        <p:cTn id="28" dur="1" fill="hold">
                                           <p:stCondLst>
                                             <p:cond delay="0"/>
                                           </p:stCondLst>
                                         </p:cTn>
                                         <p:tgtEl>
-                                          <p:spTgt spid="5">
-                                            <p:txEl>
-                                              <p:pRg st="4" end="4"/>
-                                            </p:txEl>
-                                          </p:spTgt>
+                                          <p:spTgt spid="3"/>
                                         </p:tgtEl>
                                         <p:attrNameLst>
                                           <p:attrName>style.visibility</p:attrName>
@@ -24508,38 +25236,94 @@
                                     </p:set>
                                     <p:animEffect transition="in" filter="fade">
                                       <p:cBhvr>
-                                        <p:cTn id="22" dur="500"/>
+                                        <p:cTn id="29" dur="2000"/>
                                         <p:tgtEl>
-                                          <p:spTgt spid="5">
-                                            <p:txEl>
-                                              <p:pRg st="4" end="4"/>
-                                            </p:txEl>
-                                          </p:spTgt>
+                                          <p:spTgt spid="3"/>
                                         </p:tgtEl>
                                       </p:cBhvr>
                                     </p:animEffect>
+                                    <p:anim calcmode="lin" valueType="num">
+                                      <p:cBhvr>
+                                        <p:cTn id="30" dur="2000" fill="hold"/>
+                                        <p:tgtEl>
+                                          <p:spTgt spid="3"/>
+                                        </p:tgtEl>
+                                        <p:attrNameLst>
+                                          <p:attrName>ppt_w</p:attrName>
+                                        </p:attrNameLst>
+                                      </p:cBhvr>
+                                      <p:tavLst>
+                                        <p:tav tm="0" fmla="#ppt_w*sin(2.5*pi*$)">
+                                          <p:val>
+                                            <p:fltVal val="0"/>
+                                          </p:val>
+                                        </p:tav>
+                                        <p:tav tm="100000">
+                                          <p:val>
+                                            <p:fltVal val="1"/>
+                                          </p:val>
+                                        </p:tav>
+                                      </p:tavLst>
+                                    </p:anim>
+                                    <p:anim calcmode="lin" valueType="num">
+                                      <p:cBhvr>
+                                        <p:cTn id="31" dur="2000" fill="hold"/>
+                                        <p:tgtEl>
+                                          <p:spTgt spid="3"/>
+                                        </p:tgtEl>
+                                        <p:attrNameLst>
+                                          <p:attrName>ppt_h</p:attrName>
+                                        </p:attrNameLst>
+                                      </p:cBhvr>
+                                      <p:tavLst>
+                                        <p:tav tm="0">
+                                          <p:val>
+                                            <p:strVal val="#ppt_h"/>
+                                          </p:val>
+                                        </p:tav>
+                                        <p:tav tm="100000">
+                                          <p:val>
+                                            <p:strVal val="#ppt_h"/>
+                                          </p:val>
+                                        </p:tav>
+                                      </p:tavLst>
+                                    </p:anim>
                                   </p:childTnLst>
                                 </p:cTn>
                               </p:par>
+                            </p:childTnLst>
+                          </p:cTn>
+                        </p:par>
+                      </p:childTnLst>
+                    </p:cTn>
+                  </p:par>
+                  <p:par>
+                    <p:cTn id="32" fill="hold">
+                      <p:stCondLst>
+                        <p:cond delay="indefinite"/>
+                      </p:stCondLst>
+                      <p:childTnLst>
+                        <p:par>
+                          <p:cTn id="33" fill="hold">
+                            <p:stCondLst>
+                              <p:cond delay="0"/>
+                            </p:stCondLst>
+                            <p:childTnLst>
                               <p:par>
-                                <p:cTn id="23" presetID="10" presetClass="entr" presetSubtype="0" fill="hold" nodeType="withEffect">
+                                <p:cTn id="34" presetID="10" presetClass="entr" presetSubtype="0" fill="hold" nodeType="clickEffect">
                                   <p:stCondLst>
                                     <p:cond delay="0"/>
                                   </p:stCondLst>
                                   <p:childTnLst>
                                     <p:set>
                                       <p:cBhvr>
-                                        <p:cTn id="24" dur="1" fill="hold">
+                                        <p:cTn id="35" dur="1" fill="hold">
                                           <p:stCondLst>
                                             <p:cond delay="0"/>
                                           </p:stCondLst>
                                         </p:cTn>
                                         <p:tgtEl>
-                                          <p:spTgt spid="5">
-                                            <p:txEl>
-                                              <p:pRg st="5" end="5"/>
-                                            </p:txEl>
-                                          </p:spTgt>
+                                          <p:spTgt spid="11"/>
                                         </p:tgtEl>
                                         <p:attrNameLst>
                                           <p:attrName>style.visibility</p:attrName>
@@ -24551,142 +25335,9 @@
                                     </p:set>
                                     <p:animEffect transition="in" filter="fade">
                                       <p:cBhvr>
-                                        <p:cTn id="25" dur="500"/>
+                                        <p:cTn id="36" dur="500"/>
                                         <p:tgtEl>
-                                          <p:spTgt spid="5">
-                                            <p:txEl>
-                                              <p:pRg st="5" end="5"/>
-                                            </p:txEl>
-                                          </p:spTgt>
-                                        </p:tgtEl>
-                                      </p:cBhvr>
-                                    </p:animEffect>
-                                  </p:childTnLst>
-                                </p:cTn>
-                              </p:par>
-                              <p:par>
-                                <p:cTn id="26" presetID="10" presetClass="entr" presetSubtype="0" fill="hold" nodeType="withEffect">
-                                  <p:stCondLst>
-                                    <p:cond delay="0"/>
-                                  </p:stCondLst>
-                                  <p:childTnLst>
-                                    <p:set>
-                                      <p:cBhvr>
-                                        <p:cTn id="27" dur="1" fill="hold">
-                                          <p:stCondLst>
-                                            <p:cond delay="0"/>
-                                          </p:stCondLst>
-                                        </p:cTn>
-                                        <p:tgtEl>
-                                          <p:spTgt spid="5">
-                                            <p:txEl>
-                                              <p:pRg st="6" end="6"/>
-                                            </p:txEl>
-                                          </p:spTgt>
-                                        </p:tgtEl>
-                                        <p:attrNameLst>
-                                          <p:attrName>style.visibility</p:attrName>
-                                        </p:attrNameLst>
-                                      </p:cBhvr>
-                                      <p:to>
-                                        <p:strVal val="visible"/>
-                                      </p:to>
-                                    </p:set>
-                                    <p:animEffect transition="in" filter="fade">
-                                      <p:cBhvr>
-                                        <p:cTn id="28" dur="500"/>
-                                        <p:tgtEl>
-                                          <p:spTgt spid="5">
-                                            <p:txEl>
-                                              <p:pRg st="6" end="6"/>
-                                            </p:txEl>
-                                          </p:spTgt>
-                                        </p:tgtEl>
-                                      </p:cBhvr>
-                                    </p:animEffect>
-                                  </p:childTnLst>
-                                </p:cTn>
-                              </p:par>
-                              <p:par>
-                                <p:cTn id="29" presetID="10" presetClass="entr" presetSubtype="0" fill="hold" nodeType="withEffect">
-                                  <p:stCondLst>
-                                    <p:cond delay="0"/>
-                                  </p:stCondLst>
-                                  <p:childTnLst>
-                                    <p:set>
-                                      <p:cBhvr>
-                                        <p:cTn id="30" dur="1" fill="hold">
-                                          <p:stCondLst>
-                                            <p:cond delay="0"/>
-                                          </p:stCondLst>
-                                        </p:cTn>
-                                        <p:tgtEl>
-                                          <p:spTgt spid="5">
-                                            <p:txEl>
-                                              <p:pRg st="7" end="7"/>
-                                            </p:txEl>
-                                          </p:spTgt>
-                                        </p:tgtEl>
-                                        <p:attrNameLst>
-                                          <p:attrName>style.visibility</p:attrName>
-                                        </p:attrNameLst>
-                                      </p:cBhvr>
-                                      <p:to>
-                                        <p:strVal val="visible"/>
-                                      </p:to>
-                                    </p:set>
-                                    <p:animEffect transition="in" filter="fade">
-                                      <p:cBhvr>
-                                        <p:cTn id="31" dur="500"/>
-                                        <p:tgtEl>
-                                          <p:spTgt spid="5">
-                                            <p:txEl>
-                                              <p:pRg st="7" end="7"/>
-                                            </p:txEl>
-                                          </p:spTgt>
-                                        </p:tgtEl>
-                                      </p:cBhvr>
-                                    </p:animEffect>
-                                  </p:childTnLst>
-                                </p:cTn>
-                              </p:par>
-                              <p:par>
-                                <p:cTn id="32" presetID="10" presetClass="entr" presetSubtype="0" fill="hold" nodeType="withEffect">
-                                  <p:stCondLst>
-                                    <p:cond delay="0"/>
-                                  </p:stCondLst>
-                                  <p:childTnLst>
-                                    <p:set>
-                                      <p:cBhvr>
-                                        <p:cTn id="33" dur="1" fill="hold">
-                                          <p:stCondLst>
-                                            <p:cond delay="0"/>
-                                          </p:stCondLst>
-                                        </p:cTn>
-                                        <p:tgtEl>
-                                          <p:spTgt spid="5">
-                                            <p:txEl>
-                                              <p:pRg st="8" end="8"/>
-                                            </p:txEl>
-                                          </p:spTgt>
-                                        </p:tgtEl>
-                                        <p:attrNameLst>
-                                          <p:attrName>style.visibility</p:attrName>
-                                        </p:attrNameLst>
-                                      </p:cBhvr>
-                                      <p:to>
-                                        <p:strVal val="visible"/>
-                                      </p:to>
-                                    </p:set>
-                                    <p:animEffect transition="in" filter="fade">
-                                      <p:cBhvr>
-                                        <p:cTn id="34" dur="500"/>
-                                        <p:tgtEl>
-                                          <p:spTgt spid="5">
-                                            <p:txEl>
-                                              <p:pRg st="8" end="8"/>
-                                            </p:txEl>
-                                          </p:spTgt>
+                                          <p:spTgt spid="11"/>
                                         </p:tgtEl>
                                       </p:cBhvr>
                                     </p:animEffect>
@@ -24700,32 +25351,32 @@
                     </p:cTn>
                   </p:par>
                   <p:par>
-                    <p:cTn id="35" fill="hold">
+                    <p:cTn id="37" fill="hold">
                       <p:stCondLst>
                         <p:cond delay="indefinite"/>
                       </p:stCondLst>
                       <p:childTnLst>
                         <p:par>
-                          <p:cTn id="36" fill="hold">
+                          <p:cTn id="38" fill="hold">
                             <p:stCondLst>
                               <p:cond delay="0"/>
                             </p:stCondLst>
                             <p:childTnLst>
                               <p:par>
-                                <p:cTn id="37" presetID="10" presetClass="entr" presetSubtype="0" fill="hold" nodeType="clickEffect">
+                                <p:cTn id="39" presetID="45" presetClass="entr" presetSubtype="0" fill="hold" grpId="0" nodeType="clickEffect">
                                   <p:stCondLst>
                                     <p:cond delay="0"/>
                                   </p:stCondLst>
                                   <p:childTnLst>
                                     <p:set>
                                       <p:cBhvr>
-                                        <p:cTn id="38" dur="1" fill="hold">
+                                        <p:cTn id="40" dur="1" fill="hold">
                                           <p:stCondLst>
                                             <p:cond delay="0"/>
                                           </p:stCondLst>
                                         </p:cTn>
                                         <p:tgtEl>
-                                          <p:spTgt spid="2"/>
+                                          <p:spTgt spid="21"/>
                                         </p:tgtEl>
                                         <p:attrNameLst>
                                           <p:attrName>style.visibility</p:attrName>
@@ -24737,12 +25388,58 @@
                                     </p:set>
                                     <p:animEffect transition="in" filter="fade">
                                       <p:cBhvr>
-                                        <p:cTn id="39" dur="500"/>
+                                        <p:cTn id="41" dur="2000"/>
                                         <p:tgtEl>
-                                          <p:spTgt spid="2"/>
+                                          <p:spTgt spid="21"/>
                                         </p:tgtEl>
                                       </p:cBhvr>
                                     </p:animEffect>
+                                    <p:anim calcmode="lin" valueType="num">
+                                      <p:cBhvr>
+                                        <p:cTn id="42" dur="2000" fill="hold"/>
+                                        <p:tgtEl>
+                                          <p:spTgt spid="21"/>
+                                        </p:tgtEl>
+                                        <p:attrNameLst>
+                                          <p:attrName>ppt_w</p:attrName>
+                                        </p:attrNameLst>
+                                      </p:cBhvr>
+                                      <p:tavLst>
+                                        <p:tav tm="0" fmla="#ppt_w*sin(2.5*pi*$)">
+                                          <p:val>
+                                            <p:fltVal val="0"/>
+                                          </p:val>
+                                        </p:tav>
+                                        <p:tav tm="100000">
+                                          <p:val>
+                                            <p:fltVal val="1"/>
+                                          </p:val>
+                                        </p:tav>
+                                      </p:tavLst>
+                                    </p:anim>
+                                    <p:anim calcmode="lin" valueType="num">
+                                      <p:cBhvr>
+                                        <p:cTn id="43" dur="2000" fill="hold"/>
+                                        <p:tgtEl>
+                                          <p:spTgt spid="21"/>
+                                        </p:tgtEl>
+                                        <p:attrNameLst>
+                                          <p:attrName>ppt_h</p:attrName>
+                                        </p:attrNameLst>
+                                      </p:cBhvr>
+                                      <p:tavLst>
+                                        <p:tav tm="0">
+                                          <p:val>
+                                            <p:strVal val="#ppt_h"/>
+                                          </p:val>
+                                        </p:tav>
+                                        <p:tav tm="100000">
+                                          <p:val>
+                                            <p:strVal val="#ppt_h"/>
+                                          </p:val>
+                                        </p:tav>
+                                      </p:tavLst>
+                                    </p:anim>
                                   </p:childTnLst>
                                 </p:cTn>
                               </p:par>
@@ -24753,36 +25450,32 @@
                     </p:cTn>
                   </p:par>
                   <p:par>
-                    <p:cTn id="40" fill="hold">
+                    <p:cTn id="44" fill="hold">
                       <p:stCondLst>
                         <p:cond delay="indefinite"/>
                       </p:stCondLst>
                       <p:childTnLst>
                         <p:par>
-                          <p:cTn id="41" fill="hold">
+                          <p:cTn id="45" fill="hold">
                             <p:stCondLst>
                               <p:cond delay="0"/>
                             </p:stCondLst>
                             <p:childTnLst>
                               <p:par>
-                                <p:cTn id="42" presetID="10" presetClass="entr" presetSubtype="0" fill="hold" nodeType="clickEffect">
+                                <p:cTn id="46" presetID="45" presetClass="entr" presetSubtype="0" fill="hold" grpId="0" nodeType="clickEffect">
                                   <p:stCondLst>
                                     <p:cond delay="0"/>
                                   </p:stCondLst>
                                   <p:childTnLst>
                                     <p:set>
                                       <p:cBhvr>
-                                        <p:cTn id="43" dur="1" fill="hold">
+                                        <p:cTn id="47" dur="1" fill="hold">
                                           <p:stCondLst>
                                             <p:cond delay="0"/>
                                           </p:stCondLst>
                                         </p:cTn>
                                         <p:tgtEl>
-                                          <p:spTgt spid="5">
-                                            <p:txEl>
-                                              <p:pRg st="9" end="9"/>
-                                            </p:txEl>
-                                          </p:spTgt>
+                                          <p:spTgt spid="28"/>
                                         </p:tgtEl>
                                         <p:attrNameLst>
                                           <p:attrName>style.visibility</p:attrName>
@@ -24794,16 +25487,58 @@
                                     </p:set>
                                     <p:animEffect transition="in" filter="fade">
                                       <p:cBhvr>
-                                        <p:cTn id="44" dur="500"/>
+                                        <p:cTn id="48" dur="2000"/>
                                         <p:tgtEl>
-                                          <p:spTgt spid="5">
-                                            <p:txEl>
-                                              <p:pRg st="9" end="9"/>
-                                            </p:txEl>
-                                          </p:spTgt>
+                                          <p:spTgt spid="28"/>
                                         </p:tgtEl>
                                       </p:cBhvr>
                                     </p:animEffect>
+                                    <p:anim calcmode="lin" valueType="num">
+                                      <p:cBhvr>
+                                        <p:cTn id="49" dur="2000" fill="hold"/>
+                                        <p:tgtEl>
+                                          <p:spTgt spid="28"/>
+                                        </p:tgtEl>
+                                        <p:attrNameLst>
+                                          <p:attrName>ppt_w</p:attrName>
+                                        </p:attrNameLst>
+                                      </p:cBhvr>
+                                      <p:tavLst>
+                                        <p:tav tm="0" fmla="#ppt_w*sin(2.5*pi*$)">
+                                          <p:val>
+                                            <p:fltVal val="0"/>
+                                          </p:val>
+                                        </p:tav>
+                                        <p:tav tm="100000">
+                                          <p:val>
+                                            <p:fltVal val="1"/>
+                                          </p:val>
+                                        </p:tav>
+                                      </p:tavLst>
+                                    </p:anim>
+                                    <p:anim calcmode="lin" valueType="num">
+                                      <p:cBhvr>
+                                        <p:cTn id="50" dur="2000" fill="hold"/>
+                                        <p:tgtEl>
+                                          <p:spTgt spid="28"/>
+                                        </p:tgtEl>
+                                        <p:attrNameLst>
+                                          <p:attrName>ppt_h</p:attrName>
+                                        </p:attrNameLst>
+                                      </p:cBhvr>
+                                      <p:tavLst>
+                                        <p:tav tm="0">
+                                          <p:val>
+                                            <p:strVal val="#ppt_h"/>
+                                          </p:val>
+                                        </p:tav>
+                                        <p:tav tm="100000">
+                                          <p:val>
+                                            <p:strVal val="#ppt_h"/>
+                                          </p:val>
+                                        </p:tav>
+                                      </p:tavLst>
+                                    </p:anim>
                                   </p:childTnLst>
                                 </p:cTn>
                               </p:par>
@@ -24814,36 +25549,32 @@
                     </p:cTn>
                   </p:par>
                   <p:par>
-                    <p:cTn id="45" fill="hold">
+                    <p:cTn id="51" fill="hold">
                       <p:stCondLst>
                         <p:cond delay="indefinite"/>
                       </p:stCondLst>
                       <p:childTnLst>
                         <p:par>
-                          <p:cTn id="46" fill="hold">
+                          <p:cTn id="52" fill="hold">
                             <p:stCondLst>
                               <p:cond delay="0"/>
                             </p:stCondLst>
                             <p:childTnLst>
                               <p:par>
-                                <p:cTn id="47" presetID="10" presetClass="entr" presetSubtype="0" fill="hold" nodeType="clickEffect">
+                                <p:cTn id="53" presetID="45" presetClass="entr" presetSubtype="0" fill="hold" grpId="0" nodeType="clickEffect">
                                   <p:stCondLst>
                                     <p:cond delay="0"/>
                                   </p:stCondLst>
                                   <p:childTnLst>
                                     <p:set>
                                       <p:cBhvr>
-                                        <p:cTn id="48" dur="1" fill="hold">
+                                        <p:cTn id="54" dur="1" fill="hold">
                                           <p:stCondLst>
                                             <p:cond delay="0"/>
                                           </p:stCondLst>
                                         </p:cTn>
                                         <p:tgtEl>
-                                          <p:spTgt spid="5">
-                                            <p:txEl>
-                                              <p:pRg st="10" end="10"/>
-                                            </p:txEl>
-                                          </p:spTgt>
+                                          <p:spTgt spid="29"/>
                                         </p:tgtEl>
                                         <p:attrNameLst>
                                           <p:attrName>style.visibility</p:attrName>
@@ -24855,112 +25586,58 @@
                                     </p:set>
                                     <p:animEffect transition="in" filter="fade">
                                       <p:cBhvr>
-                                        <p:cTn id="49" dur="500"/>
+                                        <p:cTn id="55" dur="2000"/>
                                         <p:tgtEl>
-                                          <p:spTgt spid="5">
-                                            <p:txEl>
-                                              <p:pRg st="10" end="10"/>
-                                            </p:txEl>
-                                          </p:spTgt>
+                                          <p:spTgt spid="29"/>
                                         </p:tgtEl>
                                       </p:cBhvr>
                                     </p:animEffect>
-                                  </p:childTnLst>
-                                </p:cTn>
-                              </p:par>
-                              <p:par>
-                                <p:cTn id="50" presetID="10" presetClass="entr" presetSubtype="0" fill="hold" nodeType="withEffect">
-                                  <p:stCondLst>
-                                    <p:cond delay="0"/>
-                                  </p:stCondLst>
-                                  <p:childTnLst>
-                                    <p:set>
+                                    <p:anim calcmode="lin" valueType="num">
                                       <p:cBhvr>
-                                        <p:cTn id="51" dur="1" fill="hold">
-                                          <p:stCondLst>
-                                            <p:cond delay="0"/>
-                                          </p:stCondLst>
-                                        </p:cTn>
+                                        <p:cTn id="56" dur="2000" fill="hold"/>
                                         <p:tgtEl>
-                                          <p:spTgt spid="5">
-                                            <p:txEl>
-                                              <p:pRg st="11" end="11"/>
-                                            </p:txEl>
-                                          </p:spTgt>
+                                          <p:spTgt spid="29"/>
                                         </p:tgtEl>
                                         <p:attrNameLst>
-                                          <p:attrName>style.visibility</p:attrName>
+                                          <p:attrName>ppt_w</p:attrName>
                                         </p:attrNameLst>
                                       </p:cBhvr>
-                                      <p:to>
-                                        <p:strVal val="visible"/>
-                                      </p:to>
-                                    </p:set>
-                                    <p:animEffect transition="in" filter="fade">
+                                      <p:tavLst>
+                                        <p:tav tm="0" fmla="#ppt_w*sin(2.5*pi*$)">
+                                          <p:val>
+                                            <p:fltVal val="0"/>
+                                          </p:val>
+                                        </p:tav>
+                                        <p:tav tm="100000">
+                                          <p:val>
+                                            <p:fltVal val="1"/>
+                                          </p:val>
+                                        </p:tav>
+                                      </p:tavLst>
+                                    </p:anim>
+                                    <p:anim calcmode="lin" valueType="num">
                                       <p:cBhvr>
-                                        <p:cTn id="52" dur="500"/>
+                                        <p:cTn id="57" dur="2000" fill="hold"/>
                                         <p:tgtEl>
-                                          <p:spTgt spid="5">
-                                            <p:txEl>
-                                              <p:pRg st="11" end="11"/>
-                                            </p:txEl>
-                                          </p:spTgt>
-                                        </p:tgtEl>
-                                      </p:cBhvr>
-                                    </p:animEffect>
-                                  </p:childTnLst>
-                                </p:cTn>
-                              </p:par>
-                            </p:childTnLst>
-                          </p:cTn>
-                        </p:par>
-                      </p:childTnLst>
-                    </p:cTn>
-                  </p:par>
-                  <p:par>
-                    <p:cTn id="53" fill="hold">
-                      <p:stCondLst>
-                        <p:cond delay="indefinite"/>
-                      </p:stCondLst>
-                      <p:childTnLst>
-                        <p:par>
-                          <p:cTn id="54" fill="hold">
-                            <p:stCondLst>
-                              <p:cond delay="0"/>
-                            </p:stCondLst>
-                            <p:childTnLst>
-                              <p:par>
-                                <p:cTn id="55" presetID="10" presetClass="entr" presetSubtype="0" fill="hold" nodeType="clickEffect">
-                                  <p:stCondLst>
-                                    <p:cond delay="0"/>
-                                  </p:stCondLst>
-                                  <p:childTnLst>
-                                    <p:set>
-                                      <p:cBhvr>
-                                        <p:cTn id="56" dur="1" fill="hold">
-                                          <p:stCondLst>
-                                            <p:cond delay="0"/>
-                                          </p:stCondLst>
-                                        </p:cTn>
-                                        <p:tgtEl>
-                                          <p:spTgt spid="9"/>
+                                          <p:spTgt spid="29"/>
                                         </p:tgtEl>
                                         <p:attrNameLst>
-                                          <p:attrName>style.visibility</p:attrName>
+                                          <p:attrName>ppt_h</p:attrName>
                                         </p:attrNameLst>
                                       </p:cBhvr>
-                                      <p:to>
-                                        <p:strVal val="visible"/>
-                                      </p:to>
-                                    </p:set>
-                                    <p:animEffect transition="in" filter="fade">
-                                      <p:cBhvr>
-                                        <p:cTn id="57" dur="500"/>
-                                        <p:tgtEl>
-                                          <p:spTgt spid="9"/>
-                                        </p:tgtEl>
-                                      </p:cBhvr>
-                                    </p:animEffect>
+                                      <p:tavLst>
+                                        <p:tav tm="0">
+                                          <p:val>
+                                            <p:strVal val="#ppt_h"/>
+                                          </p:val>
+                                        </p:tav>
+                                        <p:tav tm="100000">
+                                          <p:val>
+                                            <p:strVal val="#ppt_h"/>
+                                          </p:val>
+                                        </p:tav>
+                                      </p:tavLst>
+                                    </p:anim>
                                   </p:childTnLst>
                                 </p:cTn>
                               </p:par>
@@ -24983,7 +25660,7 @@
                             </p:stCondLst>
                             <p:childTnLst>
                               <p:par>
-                                <p:cTn id="60" presetID="10" presetClass="entr" presetSubtype="0" fill="hold" nodeType="clickEffect">
+                                <p:cTn id="60" presetID="1" presetClass="exit" presetSubtype="0" fill="hold" grpId="0" nodeType="clickEffect">
                                   <p:stCondLst>
                                     <p:cond delay="0"/>
                                   </p:stCondLst>
@@ -24991,6 +25668,751 @@
                                     <p:set>
                                       <p:cBhvr>
                                         <p:cTn id="61" dur="1" fill="hold">
+                                          <p:stCondLst>
+                                            <p:cond delay="0"/>
+                                          </p:stCondLst>
+                                        </p:cTn>
+                                        <p:tgtEl>
+                                          <p:spTgt spid="12"/>
+                                        </p:tgtEl>
+                                        <p:attrNameLst>
+                                          <p:attrName>style.visibility</p:attrName>
+                                        </p:attrNameLst>
+                                      </p:cBhvr>
+                                      <p:to>
+                                        <p:strVal val="hidden"/>
+                                      </p:to>
+                                    </p:set>
+                                  </p:childTnLst>
+                                </p:cTn>
+                              </p:par>
+                            </p:childTnLst>
+                          </p:cTn>
+                        </p:par>
+                      </p:childTnLst>
+                    </p:cTn>
+                  </p:par>
+                  <p:par>
+                    <p:cTn id="62" fill="hold">
+                      <p:stCondLst>
+                        <p:cond delay="indefinite"/>
+                      </p:stCondLst>
+                      <p:childTnLst>
+                        <p:par>
+                          <p:cTn id="63" fill="hold">
+                            <p:stCondLst>
+                              <p:cond delay="0"/>
+                            </p:stCondLst>
+                            <p:childTnLst>
+                              <p:par>
+                                <p:cTn id="64" presetID="10" presetClass="entr" presetSubtype="0" fill="hold" nodeType="clickEffect">
+                                  <p:stCondLst>
+                                    <p:cond delay="0"/>
+                                  </p:stCondLst>
+                                  <p:childTnLst>
+                                    <p:set>
+                                      <p:cBhvr>
+                                        <p:cTn id="65" dur="1" fill="hold">
+                                          <p:stCondLst>
+                                            <p:cond delay="0"/>
+                                          </p:stCondLst>
+                                        </p:cTn>
+                                        <p:tgtEl>
+                                          <p:spTgt spid="34"/>
+                                        </p:tgtEl>
+                                        <p:attrNameLst>
+                                          <p:attrName>style.visibility</p:attrName>
+                                        </p:attrNameLst>
+                                      </p:cBhvr>
+                                      <p:to>
+                                        <p:strVal val="visible"/>
+                                      </p:to>
+                                    </p:set>
+                                    <p:animEffect transition="in" filter="fade">
+                                      <p:cBhvr>
+                                        <p:cTn id="66" dur="500"/>
+                                        <p:tgtEl>
+                                          <p:spTgt spid="34"/>
+                                        </p:tgtEl>
+                                      </p:cBhvr>
+                                    </p:animEffect>
+                                  </p:childTnLst>
+                                </p:cTn>
+                              </p:par>
+                            </p:childTnLst>
+                          </p:cTn>
+                        </p:par>
+                      </p:childTnLst>
+                    </p:cTn>
+                  </p:par>
+                  <p:par>
+                    <p:cTn id="67" fill="hold">
+                      <p:stCondLst>
+                        <p:cond delay="indefinite"/>
+                      </p:stCondLst>
+                      <p:childTnLst>
+                        <p:par>
+                          <p:cTn id="68" fill="hold">
+                            <p:stCondLst>
+                              <p:cond delay="0"/>
+                            </p:stCondLst>
+                            <p:childTnLst>
+                              <p:par>
+                                <p:cTn id="69" presetID="45" presetClass="entr" presetSubtype="0" fill="hold" grpId="0" nodeType="clickEffect">
+                                  <p:stCondLst>
+                                    <p:cond delay="0"/>
+                                  </p:stCondLst>
+                                  <p:childTnLst>
+                                    <p:set>
+                                      <p:cBhvr>
+                                        <p:cTn id="70" dur="1" fill="hold">
+                                          <p:stCondLst>
+                                            <p:cond delay="0"/>
+                                          </p:stCondLst>
+                                        </p:cTn>
+                                        <p:tgtEl>
+                                          <p:spTgt spid="35"/>
+                                        </p:tgtEl>
+                                        <p:attrNameLst>
+                                          <p:attrName>style.visibility</p:attrName>
+                                        </p:attrNameLst>
+                                      </p:cBhvr>
+                                      <p:to>
+                                        <p:strVal val="visible"/>
+                                      </p:to>
+                                    </p:set>
+                                    <p:animEffect transition="in" filter="fade">
+                                      <p:cBhvr>
+                                        <p:cTn id="71" dur="2000"/>
+                                        <p:tgtEl>
+                                          <p:spTgt spid="35"/>
+                                        </p:tgtEl>
+                                      </p:cBhvr>
+                                    </p:animEffect>
+                                    <p:anim calcmode="lin" valueType="num">
+                                      <p:cBhvr>
+                                        <p:cTn id="72" dur="2000" fill="hold"/>
+                                        <p:tgtEl>
+                                          <p:spTgt spid="35"/>
+                                        </p:tgtEl>
+                                        <p:attrNameLst>
+                                          <p:attrName>ppt_w</p:attrName>
+                                        </p:attrNameLst>
+                                      </p:cBhvr>
+                                      <p:tavLst>
+                                        <p:tav tm="0" fmla="#ppt_w*sin(2.5*pi*$)">
+                                          <p:val>
+                                            <p:fltVal val="0"/>
+                                          </p:val>
+                                        </p:tav>
+                                        <p:tav tm="100000">
+                                          <p:val>
+                                            <p:fltVal val="1"/>
+                                          </p:val>
+                                        </p:tav>
+                                      </p:tavLst>
+                                    </p:anim>
+                                    <p:anim calcmode="lin" valueType="num">
+                                      <p:cBhvr>
+                                        <p:cTn id="73" dur="2000" fill="hold"/>
+                                        <p:tgtEl>
+                                          <p:spTgt spid="35"/>
+                                        </p:tgtEl>
+                                        <p:attrNameLst>
+                                          <p:attrName>ppt_h</p:attrName>
+                                        </p:attrNameLst>
+                                      </p:cBhvr>
+                                      <p:tavLst>
+                                        <p:tav tm="0">
+                                          <p:val>
+                                            <p:strVal val="#ppt_h"/>
+                                          </p:val>
+                                        </p:tav>
+                                        <p:tav tm="100000">
+                                          <p:val>
+                                            <p:strVal val="#ppt_h"/>
+                                          </p:val>
+                                        </p:tav>
+                                      </p:tavLst>
+                                    </p:anim>
+                                  </p:childTnLst>
+                                </p:cTn>
+                              </p:par>
+                            </p:childTnLst>
+                          </p:cTn>
+                        </p:par>
+                      </p:childTnLst>
+                    </p:cTn>
+                  </p:par>
+                  <p:par>
+                    <p:cTn id="74" fill="hold">
+                      <p:stCondLst>
+                        <p:cond delay="indefinite"/>
+                      </p:stCondLst>
+                      <p:childTnLst>
+                        <p:par>
+                          <p:cTn id="75" fill="hold">
+                            <p:stCondLst>
+                              <p:cond delay="0"/>
+                            </p:stCondLst>
+                            <p:childTnLst>
+                              <p:par>
+                                <p:cTn id="76" presetID="10" presetClass="entr" presetSubtype="0" fill="hold" nodeType="clickEffect">
+                                  <p:stCondLst>
+                                    <p:cond delay="0"/>
+                                  </p:stCondLst>
+                                  <p:childTnLst>
+                                    <p:set>
+                                      <p:cBhvr>
+                                        <p:cTn id="77" dur="1" fill="hold">
+                                          <p:stCondLst>
+                                            <p:cond delay="0"/>
+                                          </p:stCondLst>
+                                        </p:cTn>
+                                        <p:tgtEl>
+                                          <p:spTgt spid="45"/>
+                                        </p:tgtEl>
+                                        <p:attrNameLst>
+                                          <p:attrName>style.visibility</p:attrName>
+                                        </p:attrNameLst>
+                                      </p:cBhvr>
+                                      <p:to>
+                                        <p:strVal val="visible"/>
+                                      </p:to>
+                                    </p:set>
+                                    <p:animEffect transition="in" filter="fade">
+                                      <p:cBhvr>
+                                        <p:cTn id="78" dur="500"/>
+                                        <p:tgtEl>
+                                          <p:spTgt spid="45"/>
+                                        </p:tgtEl>
+                                      </p:cBhvr>
+                                    </p:animEffect>
+                                  </p:childTnLst>
+                                </p:cTn>
+                              </p:par>
+                            </p:childTnLst>
+                          </p:cTn>
+                        </p:par>
+                      </p:childTnLst>
+                    </p:cTn>
+                  </p:par>
+                  <p:par>
+                    <p:cTn id="79" fill="hold">
+                      <p:stCondLst>
+                        <p:cond delay="indefinite"/>
+                      </p:stCondLst>
+                      <p:childTnLst>
+                        <p:par>
+                          <p:cTn id="80" fill="hold">
+                            <p:stCondLst>
+                              <p:cond delay="0"/>
+                            </p:stCondLst>
+                            <p:childTnLst>
+                              <p:par>
+                                <p:cTn id="81" presetID="45" presetClass="entr" presetSubtype="0" fill="hold" grpId="0" nodeType="clickEffect">
+                                  <p:stCondLst>
+                                    <p:cond delay="0"/>
+                                  </p:stCondLst>
+                                  <p:childTnLst>
+                                    <p:set>
+                                      <p:cBhvr>
+                                        <p:cTn id="82" dur="1" fill="hold">
+                                          <p:stCondLst>
+                                            <p:cond delay="0"/>
+                                          </p:stCondLst>
+                                        </p:cTn>
+                                        <p:tgtEl>
+                                          <p:spTgt spid="41"/>
+                                        </p:tgtEl>
+                                        <p:attrNameLst>
+                                          <p:attrName>style.visibility</p:attrName>
+                                        </p:attrNameLst>
+                                      </p:cBhvr>
+                                      <p:to>
+                                        <p:strVal val="visible"/>
+                                      </p:to>
+                                    </p:set>
+                                    <p:animEffect transition="in" filter="fade">
+                                      <p:cBhvr>
+                                        <p:cTn id="83" dur="2000"/>
+                                        <p:tgtEl>
+                                          <p:spTgt spid="41"/>
+                                        </p:tgtEl>
+                                      </p:cBhvr>
+                                    </p:animEffect>
+                                    <p:anim calcmode="lin" valueType="num">
+                                      <p:cBhvr>
+                                        <p:cTn id="84" dur="2000" fill="hold"/>
+                                        <p:tgtEl>
+                                          <p:spTgt spid="41"/>
+                                        </p:tgtEl>
+                                        <p:attrNameLst>
+                                          <p:attrName>ppt_w</p:attrName>
+                                        </p:attrNameLst>
+                                      </p:cBhvr>
+                                      <p:tavLst>
+                                        <p:tav tm="0" fmla="#ppt_w*sin(2.5*pi*$)">
+                                          <p:val>
+                                            <p:fltVal val="0"/>
+                                          </p:val>
+                                        </p:tav>
+                                        <p:tav tm="100000">
+                                          <p:val>
+                                            <p:fltVal val="1"/>
+                                          </p:val>
+                                        </p:tav>
+                                      </p:tavLst>
+                                    </p:anim>
+                                    <p:anim calcmode="lin" valueType="num">
+                                      <p:cBhvr>
+                                        <p:cTn id="85" dur="2000" fill="hold"/>
+                                        <p:tgtEl>
+                                          <p:spTgt spid="41"/>
+                                        </p:tgtEl>
+                                        <p:attrNameLst>
+                                          <p:attrName>ppt_h</p:attrName>
+                                        </p:attrNameLst>
+                                      </p:cBhvr>
+                                      <p:tavLst>
+                                        <p:tav tm="0">
+                                          <p:val>
+                                            <p:strVal val="#ppt_h"/>
+                                          </p:val>
+                                        </p:tav>
+                                        <p:tav tm="100000">
+                                          <p:val>
+                                            <p:strVal val="#ppt_h"/>
+                                          </p:val>
+                                        </p:tav>
+                                      </p:tavLst>
+                                    </p:anim>
+                                  </p:childTnLst>
+                                </p:cTn>
+                              </p:par>
+                            </p:childTnLst>
+                          </p:cTn>
+                        </p:par>
+                      </p:childTnLst>
+                    </p:cTn>
+                  </p:par>
+                  <p:par>
+                    <p:cTn id="86" fill="hold">
+                      <p:stCondLst>
+                        <p:cond delay="indefinite"/>
+                      </p:stCondLst>
+                      <p:childTnLst>
+                        <p:par>
+                          <p:cTn id="87" fill="hold">
+                            <p:stCondLst>
+                              <p:cond delay="0"/>
+                            </p:stCondLst>
+                            <p:childTnLst>
+                              <p:par>
+                                <p:cTn id="88" presetID="45" presetClass="entr" presetSubtype="0" fill="hold" grpId="0" nodeType="clickEffect">
+                                  <p:stCondLst>
+                                    <p:cond delay="0"/>
+                                  </p:stCondLst>
+                                  <p:childTnLst>
+                                    <p:set>
+                                      <p:cBhvr>
+                                        <p:cTn id="89" dur="1" fill="hold">
+                                          <p:stCondLst>
+                                            <p:cond delay="0"/>
+                                          </p:stCondLst>
+                                        </p:cTn>
+                                        <p:tgtEl>
+                                          <p:spTgt spid="44"/>
+                                        </p:tgtEl>
+                                        <p:attrNameLst>
+                                          <p:attrName>style.visibility</p:attrName>
+                                        </p:attrNameLst>
+                                      </p:cBhvr>
+                                      <p:to>
+                                        <p:strVal val="visible"/>
+                                      </p:to>
+                                    </p:set>
+                                    <p:animEffect transition="in" filter="fade">
+                                      <p:cBhvr>
+                                        <p:cTn id="90" dur="2000"/>
+                                        <p:tgtEl>
+                                          <p:spTgt spid="44"/>
+                                        </p:tgtEl>
+                                      </p:cBhvr>
+                                    </p:animEffect>
+                                    <p:anim calcmode="lin" valueType="num">
+                                      <p:cBhvr>
+                                        <p:cTn id="91" dur="2000" fill="hold"/>
+                                        <p:tgtEl>
+                                          <p:spTgt spid="44"/>
+                                        </p:tgtEl>
+                                        <p:attrNameLst>
+                                          <p:attrName>ppt_w</p:attrName>
+                                        </p:attrNameLst>
+                                      </p:cBhvr>
+                                      <p:tavLst>
+                                        <p:tav tm="0" fmla="#ppt_w*sin(2.5*pi*$)">
+                                          <p:val>
+                                            <p:fltVal val="0"/>
+                                          </p:val>
+                                        </p:tav>
+                                        <p:tav tm="100000">
+                                          <p:val>
+                                            <p:fltVal val="1"/>
+                                          </p:val>
+                                        </p:tav>
+                                      </p:tavLst>
+                                    </p:anim>
+                                    <p:anim calcmode="lin" valueType="num">
+                                      <p:cBhvr>
+                                        <p:cTn id="92" dur="2000" fill="hold"/>
+                                        <p:tgtEl>
+                                          <p:spTgt spid="44"/>
+                                        </p:tgtEl>
+                                        <p:attrNameLst>
+                                          <p:attrName>ppt_h</p:attrName>
+                                        </p:attrNameLst>
+                                      </p:cBhvr>
+                                      <p:tavLst>
+                                        <p:tav tm="0">
+                                          <p:val>
+                                            <p:strVal val="#ppt_h"/>
+                                          </p:val>
+                                        </p:tav>
+                                        <p:tav tm="100000">
+                                          <p:val>
+                                            <p:strVal val="#ppt_h"/>
+                                          </p:val>
+                                        </p:tav>
+                                      </p:tavLst>
+                                    </p:anim>
+                                  </p:childTnLst>
+                                </p:cTn>
+                              </p:par>
+                            </p:childTnLst>
+                          </p:cTn>
+                        </p:par>
+                      </p:childTnLst>
+                    </p:cTn>
+                  </p:par>
+                  <p:par>
+                    <p:cTn id="93" fill="hold">
+                      <p:stCondLst>
+                        <p:cond delay="indefinite"/>
+                      </p:stCondLst>
+                      <p:childTnLst>
+                        <p:par>
+                          <p:cTn id="94" fill="hold">
+                            <p:stCondLst>
+                              <p:cond delay="0"/>
+                            </p:stCondLst>
+                            <p:childTnLst>
+                              <p:par>
+                                <p:cTn id="95" presetID="45" presetClass="entr" presetSubtype="0" fill="hold" grpId="0" nodeType="clickEffect">
+                                  <p:stCondLst>
+                                    <p:cond delay="0"/>
+                                  </p:stCondLst>
+                                  <p:childTnLst>
+                                    <p:set>
+                                      <p:cBhvr>
+                                        <p:cTn id="96" dur="1" fill="hold">
+                                          <p:stCondLst>
+                                            <p:cond delay="0"/>
+                                          </p:stCondLst>
+                                        </p:cTn>
+                                        <p:tgtEl>
+                                          <p:spTgt spid="42"/>
+                                        </p:tgtEl>
+                                        <p:attrNameLst>
+                                          <p:attrName>style.visibility</p:attrName>
+                                        </p:attrNameLst>
+                                      </p:cBhvr>
+                                      <p:to>
+                                        <p:strVal val="visible"/>
+                                      </p:to>
+                                    </p:set>
+                                    <p:animEffect transition="in" filter="fade">
+                                      <p:cBhvr>
+                                        <p:cTn id="97" dur="2000"/>
+                                        <p:tgtEl>
+                                          <p:spTgt spid="42"/>
+                                        </p:tgtEl>
+                                      </p:cBhvr>
+                                    </p:animEffect>
+                                    <p:anim calcmode="lin" valueType="num">
+                                      <p:cBhvr>
+                                        <p:cTn id="98" dur="2000" fill="hold"/>
+                                        <p:tgtEl>
+                                          <p:spTgt spid="42"/>
+                                        </p:tgtEl>
+                                        <p:attrNameLst>
+                                          <p:attrName>ppt_w</p:attrName>
+                                        </p:attrNameLst>
+                                      </p:cBhvr>
+                                      <p:tavLst>
+                                        <p:tav tm="0" fmla="#ppt_w*sin(2.5*pi*$)">
+                                          <p:val>
+                                            <p:fltVal val="0"/>
+                                          </p:val>
+                                        </p:tav>
+                                        <p:tav tm="100000">
+                                          <p:val>
+                                            <p:fltVal val="1"/>
+                                          </p:val>
+                                        </p:tav>
+                                      </p:tavLst>
+                                    </p:anim>
+                                    <p:anim calcmode="lin" valueType="num">
+                                      <p:cBhvr>
+                                        <p:cTn id="99" dur="2000" fill="hold"/>
+                                        <p:tgtEl>
+                                          <p:spTgt spid="42"/>
+                                        </p:tgtEl>
+                                        <p:attrNameLst>
+                                          <p:attrName>ppt_h</p:attrName>
+                                        </p:attrNameLst>
+                                      </p:cBhvr>
+                                      <p:tavLst>
+                                        <p:tav tm="0">
+                                          <p:val>
+                                            <p:strVal val="#ppt_h"/>
+                                          </p:val>
+                                        </p:tav>
+                                        <p:tav tm="100000">
+                                          <p:val>
+                                            <p:strVal val="#ppt_h"/>
+                                          </p:val>
+                                        </p:tav>
+                                      </p:tavLst>
+                                    </p:anim>
+                                  </p:childTnLst>
+                                </p:cTn>
+                              </p:par>
+                            </p:childTnLst>
+                          </p:cTn>
+                        </p:par>
+                      </p:childTnLst>
+                    </p:cTn>
+                  </p:par>
+                  <p:par>
+                    <p:cTn id="100" fill="hold">
+                      <p:stCondLst>
+                        <p:cond delay="indefinite"/>
+                      </p:stCondLst>
+                      <p:childTnLst>
+                        <p:par>
+                          <p:cTn id="101" fill="hold">
+                            <p:stCondLst>
+                              <p:cond delay="0"/>
+                            </p:stCondLst>
+                            <p:childTnLst>
+                              <p:par>
+                                <p:cTn id="102" presetID="45" presetClass="entr" presetSubtype="0" fill="hold" grpId="0" nodeType="clickEffect">
+                                  <p:stCondLst>
+                                    <p:cond delay="0"/>
+                                  </p:stCondLst>
+                                  <p:childTnLst>
+                                    <p:set>
+                                      <p:cBhvr>
+                                        <p:cTn id="103" dur="1" fill="hold">
+                                          <p:stCondLst>
+                                            <p:cond delay="0"/>
+                                          </p:stCondLst>
+                                        </p:cTn>
+                                        <p:tgtEl>
+                                          <p:spTgt spid="43"/>
+                                        </p:tgtEl>
+                                        <p:attrNameLst>
+                                          <p:attrName>style.visibility</p:attrName>
+                                        </p:attrNameLst>
+                                      </p:cBhvr>
+                                      <p:to>
+                                        <p:strVal val="visible"/>
+                                      </p:to>
+                                    </p:set>
+                                    <p:animEffect transition="in" filter="fade">
+                                      <p:cBhvr>
+                                        <p:cTn id="104" dur="2000"/>
+                                        <p:tgtEl>
+                                          <p:spTgt spid="43"/>
+                                        </p:tgtEl>
+                                      </p:cBhvr>
+                                    </p:animEffect>
+                                    <p:anim calcmode="lin" valueType="num">
+                                      <p:cBhvr>
+                                        <p:cTn id="105" dur="2000" fill="hold"/>
+                                        <p:tgtEl>
+                                          <p:spTgt spid="43"/>
+                                        </p:tgtEl>
+                                        <p:attrNameLst>
+                                          <p:attrName>ppt_w</p:attrName>
+                                        </p:attrNameLst>
+                                      </p:cBhvr>
+                                      <p:tavLst>
+                                        <p:tav tm="0" fmla="#ppt_w*sin(2.5*pi*$)">
+                                          <p:val>
+                                            <p:fltVal val="0"/>
+                                          </p:val>
+                                        </p:tav>
+                                        <p:tav tm="100000">
+                                          <p:val>
+                                            <p:fltVal val="1"/>
+                                          </p:val>
+                                        </p:tav>
+                                      </p:tavLst>
+                                    </p:anim>
+                                    <p:anim calcmode="lin" valueType="num">
+                                      <p:cBhvr>
+                                        <p:cTn id="106" dur="2000" fill="hold"/>
+                                        <p:tgtEl>
+                                          <p:spTgt spid="43"/>
+                                        </p:tgtEl>
+                                        <p:attrNameLst>
+                                          <p:attrName>ppt_h</p:attrName>
+                                        </p:attrNameLst>
+                                      </p:cBhvr>
+                                      <p:tavLst>
+                                        <p:tav tm="0">
+                                          <p:val>
+                                            <p:strVal val="#ppt_h"/>
+                                          </p:val>
+                                        </p:tav>
+                                        <p:tav tm="100000">
+                                          <p:val>
+                                            <p:strVal val="#ppt_h"/>
+                                          </p:val>
+                                        </p:tav>
+                                      </p:tavLst>
+                                    </p:anim>
+                                  </p:childTnLst>
+                                </p:cTn>
+                              </p:par>
+                            </p:childTnLst>
+                          </p:cTn>
+                        </p:par>
+                      </p:childTnLst>
+                    </p:cTn>
+                  </p:par>
+                  <p:par>
+                    <p:cTn id="107" fill="hold">
+                      <p:stCondLst>
+                        <p:cond delay="indefinite"/>
+                      </p:stCondLst>
+                      <p:childTnLst>
+                        <p:par>
+                          <p:cTn id="108" fill="hold">
+                            <p:stCondLst>
+                              <p:cond delay="0"/>
+                            </p:stCondLst>
+                            <p:childTnLst>
+                              <p:par>
+                                <p:cTn id="109" presetID="45" presetClass="entr" presetSubtype="0" fill="hold" grpId="0" nodeType="clickEffect">
+                                  <p:stCondLst>
+                                    <p:cond delay="0"/>
+                                  </p:stCondLst>
+                                  <p:childTnLst>
+                                    <p:set>
+                                      <p:cBhvr>
+                                        <p:cTn id="110" dur="1" fill="hold">
+                                          <p:stCondLst>
+                                            <p:cond delay="0"/>
+                                          </p:stCondLst>
+                                        </p:cTn>
+                                        <p:tgtEl>
+                                          <p:spTgt spid="46"/>
+                                        </p:tgtEl>
+                                        <p:attrNameLst>
+                                          <p:attrName>style.visibility</p:attrName>
+                                        </p:attrNameLst>
+                                      </p:cBhvr>
+                                      <p:to>
+                                        <p:strVal val="visible"/>
+                                      </p:to>
+                                    </p:set>
+                                    <p:animEffect transition="in" filter="fade">
+                                      <p:cBhvr>
+                                        <p:cTn id="111" dur="2000"/>
+                                        <p:tgtEl>
+                                          <p:spTgt spid="46"/>
+                                        </p:tgtEl>
+                                      </p:cBhvr>
+                                    </p:animEffect>
+                                    <p:anim calcmode="lin" valueType="num">
+                                      <p:cBhvr>
+                                        <p:cTn id="112" dur="2000" fill="hold"/>
+                                        <p:tgtEl>
+                                          <p:spTgt spid="46"/>
+                                        </p:tgtEl>
+                                        <p:attrNameLst>
+                                          <p:attrName>ppt_w</p:attrName>
+                                        </p:attrNameLst>
+                                      </p:cBhvr>
+                                      <p:tavLst>
+                                        <p:tav tm="0" fmla="#ppt_w*sin(2.5*pi*$)">
+                                          <p:val>
+                                            <p:fltVal val="0"/>
+                                          </p:val>
+                                        </p:tav>
+                                        <p:tav tm="100000">
+                                          <p:val>
+                                            <p:fltVal val="1"/>
+                                          </p:val>
+                                        </p:tav>
+                                      </p:tavLst>
+                                    </p:anim>
+                                    <p:anim calcmode="lin" valueType="num">
+                                      <p:cBhvr>
+                                        <p:cTn id="113" dur="2000" fill="hold"/>
+                                        <p:tgtEl>
+                                          <p:spTgt spid="46"/>
+                                        </p:tgtEl>
+                                        <p:attrNameLst>
+                                          <p:attrName>ppt_h</p:attrName>
+                                        </p:attrNameLst>
+                                      </p:cBhvr>
+                                      <p:tavLst>
+                                        <p:tav tm="0">
+                                          <p:val>
+                                            <p:strVal val="#ppt_h"/>
+                                          </p:val>
+                                        </p:tav>
+                                        <p:tav tm="100000">
+                                          <p:val>
+                                            <p:strVal val="#ppt_h"/>
+                                          </p:val>
+                                        </p:tav>
+                                      </p:tavLst>
+                                    </p:anim>
+                                  </p:childTnLst>
+                                </p:cTn>
+                              </p:par>
+                            </p:childTnLst>
+                          </p:cTn>
+                        </p:par>
+                      </p:childTnLst>
+                    </p:cTn>
+                  </p:par>
+                  <p:par>
+                    <p:cTn id="114" fill="hold">
+                      <p:stCondLst>
+                        <p:cond delay="indefinite"/>
+                      </p:stCondLst>
+                      <p:childTnLst>
+                        <p:par>
+                          <p:cTn id="115" fill="hold">
+                            <p:stCondLst>
+                              <p:cond delay="0"/>
+                            </p:stCondLst>
+                            <p:childTnLst>
+                              <p:par>
+                                <p:cTn id="116" presetID="10" presetClass="entr" presetSubtype="0" fill="hold" nodeType="clickEffect">
+                                  <p:stCondLst>
+                                    <p:cond delay="0"/>
+                                  </p:stCondLst>
+                                  <p:childTnLst>
+                                    <p:set>
+                                      <p:cBhvr>
+                                        <p:cTn id="117" dur="1" fill="hold">
                                           <p:stCondLst>
                                             <p:cond delay="0"/>
                                           </p:stCondLst>
@@ -25008,7 +26430,7 @@
                                     </p:set>
                                     <p:animEffect transition="in" filter="fade">
                                       <p:cBhvr>
-                                        <p:cTn id="62" dur="500"/>
+                                        <p:cTn id="118" dur="500"/>
                                         <p:tgtEl>
                                           <p:spTgt spid="19"/>
                                         </p:tgtEl>
@@ -25024,36 +26446,32 @@
                     </p:cTn>
                   </p:par>
                   <p:par>
-                    <p:cTn id="63" fill="hold">
+                    <p:cTn id="119" fill="hold">
                       <p:stCondLst>
                         <p:cond delay="indefinite"/>
                       </p:stCondLst>
                       <p:childTnLst>
                         <p:par>
-                          <p:cTn id="64" fill="hold">
+                          <p:cTn id="120" fill="hold">
                             <p:stCondLst>
                               <p:cond delay="0"/>
                             </p:stCondLst>
                             <p:childTnLst>
                               <p:par>
-                                <p:cTn id="65" presetID="10" presetClass="entr" presetSubtype="0" fill="hold" nodeType="clickEffect">
+                                <p:cTn id="121" presetID="45" presetClass="entr" presetSubtype="0" fill="hold" grpId="0" nodeType="clickEffect">
                                   <p:stCondLst>
                                     <p:cond delay="0"/>
                                   </p:stCondLst>
                                   <p:childTnLst>
                                     <p:set>
                                       <p:cBhvr>
-                                        <p:cTn id="66" dur="1" fill="hold">
+                                        <p:cTn id="122" dur="1" fill="hold">
                                           <p:stCondLst>
                                             <p:cond delay="0"/>
                                           </p:stCondLst>
                                         </p:cTn>
                                         <p:tgtEl>
-                                          <p:spTgt spid="5">
-                                            <p:txEl>
-                                              <p:pRg st="12" end="12"/>
-                                            </p:txEl>
-                                          </p:spTgt>
+                                          <p:spTgt spid="33"/>
                                         </p:tgtEl>
                                         <p:attrNameLst>
                                           <p:attrName>style.visibility</p:attrName>
@@ -25065,138 +26483,58 @@
                                     </p:set>
                                     <p:animEffect transition="in" filter="fade">
                                       <p:cBhvr>
-                                        <p:cTn id="67" dur="500"/>
+                                        <p:cTn id="123" dur="2000"/>
                                         <p:tgtEl>
-                                          <p:spTgt spid="5">
-                                            <p:txEl>
-                                              <p:pRg st="12" end="12"/>
-                                            </p:txEl>
-                                          </p:spTgt>
+                                          <p:spTgt spid="33"/>
                                         </p:tgtEl>
                                       </p:cBhvr>
                                     </p:animEffect>
-                                  </p:childTnLst>
-                                </p:cTn>
-                              </p:par>
-                            </p:childTnLst>
-                          </p:cTn>
-                        </p:par>
-                      </p:childTnLst>
-                    </p:cTn>
-                  </p:par>
-                  <p:par>
-                    <p:cTn id="68" fill="hold">
-                      <p:stCondLst>
-                        <p:cond delay="indefinite"/>
-                      </p:stCondLst>
-                      <p:childTnLst>
-                        <p:par>
-                          <p:cTn id="69" fill="hold">
-                            <p:stCondLst>
-                              <p:cond delay="0"/>
-                            </p:stCondLst>
-                            <p:childTnLst>
-                              <p:par>
-                                <p:cTn id="70" presetID="10" presetClass="entr" presetSubtype="0" fill="hold" nodeType="clickEffect">
-                                  <p:stCondLst>
-                                    <p:cond delay="0"/>
-                                  </p:stCondLst>
-                                  <p:childTnLst>
-                                    <p:set>
+                                    <p:anim calcmode="lin" valueType="num">
                                       <p:cBhvr>
-                                        <p:cTn id="71" dur="1" fill="hold">
-                                          <p:stCondLst>
-                                            <p:cond delay="0"/>
-                                          </p:stCondLst>
-                                        </p:cTn>
+                                        <p:cTn id="124" dur="2000" fill="hold"/>
                                         <p:tgtEl>
-                                          <p:spTgt spid="5">
-                                            <p:txEl>
-                                              <p:pRg st="13" end="13"/>
-                                            </p:txEl>
-                                          </p:spTgt>
+                                          <p:spTgt spid="33"/>
                                         </p:tgtEl>
                                         <p:attrNameLst>
-                                          <p:attrName>style.visibility</p:attrName>
+                                          <p:attrName>ppt_w</p:attrName>
                                         </p:attrNameLst>
                                       </p:cBhvr>
-                                      <p:to>
-                                        <p:strVal val="visible"/>
-                                      </p:to>
-                                    </p:set>
-                                    <p:animEffect transition="in" filter="fade">
+                                      <p:tavLst>
+                                        <p:tav tm="0" fmla="#ppt_w*sin(2.5*pi*$)">
+                                          <p:val>
+                                            <p:fltVal val="0"/>
+                                          </p:val>
+                                        </p:tav>
+                                        <p:tav tm="100000">
+                                          <p:val>
+                                            <p:fltVal val="1"/>
+                                          </p:val>
+                                        </p:tav>
+                                      </p:tavLst>
+                                    </p:anim>
+                                    <p:anim calcmode="lin" valueType="num">
                                       <p:cBhvr>
-                                        <p:cTn id="72" dur="500"/>
+                                        <p:cTn id="125" dur="2000" fill="hold"/>
                                         <p:tgtEl>
-                                          <p:spTgt spid="5">
-                                            <p:txEl>
-                                              <p:pRg st="13" end="13"/>
-                                            </p:txEl>
-                                          </p:spTgt>
-                                        </p:tgtEl>
-                                      </p:cBhvr>
-                                    </p:animEffect>
-                                  </p:childTnLst>
-                                </p:cTn>
-                              </p:par>
-                            </p:childTnLst>
-                          </p:cTn>
-                        </p:par>
-                      </p:childTnLst>
-                    </p:cTn>
-                  </p:par>
-                  <p:par>
-                    <p:cTn id="73" fill="hold">
-                      <p:stCondLst>
-                        <p:cond delay="indefinite"/>
-                      </p:stCondLst>
-                      <p:childTnLst>
-                        <p:par>
-                          <p:cTn id="74" fill="hold">
-                            <p:stCondLst>
-                              <p:cond delay="0"/>
-                            </p:stCondLst>
-                            <p:childTnLst>
-                              <p:par>
-                                <p:cTn id="75" presetID="10" presetClass="entr" presetSubtype="0" fill="hold" nodeType="clickEffect">
-                                  <p:stCondLst>
-                                    <p:cond delay="0"/>
-                                  </p:stCondLst>
-                                  <p:childTnLst>
-                                    <p:set>
-                                      <p:cBhvr>
-                                        <p:cTn id="76" dur="1" fill="hold">
-                                          <p:stCondLst>
-                                            <p:cond delay="0"/>
-                                          </p:stCondLst>
-                                        </p:cTn>
-                                        <p:tgtEl>
-                                          <p:spTgt spid="5">
-                                            <p:txEl>
-                                              <p:pRg st="14" end="14"/>
-                                            </p:txEl>
-                                          </p:spTgt>
+                                          <p:spTgt spid="33"/>
                                         </p:tgtEl>
                                         <p:attrNameLst>
-                                          <p:attrName>style.visibility</p:attrName>
+                                          <p:attrName>ppt_h</p:attrName>
                                         </p:attrNameLst>
                                       </p:cBhvr>
-                                      <p:to>
-                                        <p:strVal val="visible"/>
-                                      </p:to>
-                                    </p:set>
-                                    <p:animEffect transition="in" filter="fade">
-                                      <p:cBhvr>
-                                        <p:cTn id="77" dur="500"/>
-                                        <p:tgtEl>
-                                          <p:spTgt spid="5">
-                                            <p:txEl>
-                                              <p:pRg st="14" end="14"/>
-                                            </p:txEl>
-                                          </p:spTgt>
-                                        </p:tgtEl>
-                                      </p:cBhvr>
-                                    </p:animEffect>
+                                      <p:tavLst>
+                                        <p:tav tm="0">
+                                          <p:val>
+                                            <p:strVal val="#ppt_h"/>
+                                          </p:val>
+                                        </p:tav>
+                                        <p:tav tm="100000">
+                                          <p:val>
+                                            <p:strVal val="#ppt_h"/>
+                                          </p:val>
+                                        </p:tav>
+                                      </p:tavLst>
+                                    </p:anim>
                                   </p:childTnLst>
                                 </p:cTn>
                               </p:par>
@@ -25227,6 +26565,22 @@
         </p:cTn>
       </p:par>
     </p:tnLst>
+    <p:bldLst>
+      <p:bldP spid="5" grpId="0"/>
+      <p:bldP spid="3" grpId="0" animBg="1"/>
+      <p:bldP spid="20" grpId="0" animBg="1"/>
+      <p:bldP spid="21" grpId="0" animBg="1"/>
+      <p:bldP spid="28" grpId="0" animBg="1"/>
+      <p:bldP spid="29" grpId="0" animBg="1"/>
+      <p:bldP spid="33" grpId="0" animBg="1"/>
+      <p:bldP spid="12" grpId="0" animBg="1"/>
+      <p:bldP spid="35" grpId="0" animBg="1"/>
+      <p:bldP spid="41" grpId="0" animBg="1"/>
+      <p:bldP spid="42" grpId="0" animBg="1"/>
+      <p:bldP spid="43" grpId="0" animBg="1"/>
+      <p:bldP spid="44" grpId="0" animBg="1"/>
+      <p:bldP spid="46" grpId="0" animBg="1"/>
+    </p:bldLst>
   </p:timing>
 </p:sld>
 </file>

</xml_diff>